<commit_message>
att do treinamento nivel 1
</commit_message>
<xml_diff>
--- a/Treinamento FAST REPORT/treinamento fast - nível 1 parte 2.pptx
+++ b/Treinamento FAST REPORT/treinamento fast - nível 1 parte 2.pptx
@@ -10,21 +10,15 @@
     <p:sldId id="258" r:id="rId5"/>
     <p:sldId id="346" r:id="rId6"/>
     <p:sldId id="261" r:id="rId7"/>
-    <p:sldId id="380" r:id="rId8"/>
-    <p:sldId id="347" r:id="rId9"/>
-    <p:sldId id="348" r:id="rId10"/>
-    <p:sldId id="349" r:id="rId11"/>
-    <p:sldId id="350" r:id="rId12"/>
-    <p:sldId id="370" r:id="rId13"/>
-    <p:sldId id="371" r:id="rId14"/>
-    <p:sldId id="372" r:id="rId15"/>
-    <p:sldId id="373" r:id="rId16"/>
-    <p:sldId id="374" r:id="rId17"/>
-    <p:sldId id="345" r:id="rId18"/>
-    <p:sldId id="302" r:id="rId19"/>
-    <p:sldId id="301" r:id="rId20"/>
-    <p:sldId id="303" r:id="rId21"/>
-    <p:sldId id="304" r:id="rId22"/>
+    <p:sldId id="347" r:id="rId8"/>
+    <p:sldId id="348" r:id="rId9"/>
+    <p:sldId id="349" r:id="rId10"/>
+    <p:sldId id="350" r:id="rId11"/>
+    <p:sldId id="370" r:id="rId12"/>
+    <p:sldId id="371" r:id="rId13"/>
+    <p:sldId id="372" r:id="rId14"/>
+    <p:sldId id="373" r:id="rId15"/>
+    <p:sldId id="374" r:id="rId16"/>
   </p:sldIdLst>
   <p:sldSz cx="9144000" cy="5143500"/>
   <p:notesSz cx="6858000" cy="9144000"/>
@@ -5418,28 +5412,6 @@
           <a:bodyPr/>
           <a:p>
             <a:r>
-              <a:rPr lang="pt-BR" sz="2400" b="1" strike="noStrike">
-                <a:solidFill>
-                  <a:srgbClr val="00315D"/>
-                </a:solidFill>
-                <a:latin typeface="Arial" panose="020B0604020202020204"/>
-                <a:ea typeface="Arial" panose="020B0604020202020204"/>
-                <a:sym typeface="+mn-ea"/>
-              </a:rPr>
-              <a:t>Parâmetros</a:t>
-            </a:r>
-            <a:r>
-              <a:rPr lang="pt-BR" sz="2400" b="1" i="1" strike="noStrike">
-                <a:solidFill>
-                  <a:srgbClr val="00315D"/>
-                </a:solidFill>
-                <a:latin typeface="Arial" panose="020B0604020202020204"/>
-                <a:ea typeface="Arial" panose="020B0604020202020204"/>
-                <a:sym typeface="+mn-ea"/>
-              </a:rPr>
-              <a:t> - </a:t>
-            </a:r>
-            <a:r>
               <a:rPr lang="pt-BR" sz="2400" b="1" i="0" strike="noStrike">
                 <a:solidFill>
                   <a:srgbClr val="00315D"/>
@@ -5448,9 +5420,9 @@
                 <a:ea typeface="Arial" panose="020B0604020202020204"/>
                 <a:sym typeface="+mn-ea"/>
               </a:rPr>
-              <a:t>Como criar</a:t>
-            </a:r>
-            <a:endParaRPr lang="pt-BR" altLang="en-US" sz="2400" b="1" i="1" strike="noStrike">
+              <a:t>Parâmetros - Como criar </a:t>
+            </a:r>
+            <a:endParaRPr lang="pt-BR" altLang="en-US" sz="2400" b="1" i="0" strike="noStrike">
               <a:solidFill>
                 <a:srgbClr val="00315D"/>
               </a:solidFill>
@@ -5480,18 +5452,161 @@
         <p:txBody>
           <a:bodyPr/>
           <a:p>
-            <a:pPr marL="285750" indent="-285750">
+            <a:pPr marL="285750" indent="-285750" algn="just">
               <a:buFont typeface="Arial" panose="020B0604020202020204" pitchFamily="34" charset="0"/>
               <a:buChar char="•"/>
             </a:pPr>
             <a:r>
               <a:rPr lang="pt-BR" altLang="en-US" sz="1600"/>
-              <a:t>Caso sua consulta tenha paramêtros, será preciso criar uma variavel para receber o valor. Segue o vídeo abaixo demonstrando:</a:t>
-            </a:r>
-            <a:endParaRPr lang="pt-BR" altLang="en-US" sz="1600" b="0"/>
-          </a:p>
-          <a:p>
-            <a:pPr marL="285750" indent="-285750">
+              <a:t>Como demonstrado no vídeo, para </a:t>
+            </a:r>
+            <a:r>
+              <a:rPr lang="pt-BR" altLang="en-US" sz="1600" b="1">
+                <a:solidFill>
+                  <a:schemeClr val="accent1">
+                    <a:lumMod val="75000"/>
+                  </a:schemeClr>
+                </a:solidFill>
+              </a:rPr>
+              <a:t>criar </a:t>
+            </a:r>
+            <a:r>
+              <a:rPr lang="pt-BR" altLang="en-US" sz="1600"/>
+              <a:t>uma variavel, antes precisa criar uma </a:t>
+            </a:r>
+            <a:r>
+              <a:rPr lang="pt-BR" altLang="en-US" sz="1600" b="1">
+                <a:solidFill>
+                  <a:schemeClr val="accent1">
+                    <a:lumMod val="75000"/>
+                  </a:schemeClr>
+                </a:solidFill>
+              </a:rPr>
+              <a:t>pasta</a:t>
+            </a:r>
+            <a:r>
+              <a:rPr lang="pt-BR" altLang="en-US" sz="1600"/>
+              <a:t>. Outro ponto que é importante informar em relação a variavel, para criá-la dentro da pasta é preciso dar um espaço, ou seja, a </a:t>
+            </a:r>
+            <a:r>
+              <a:rPr lang="pt-BR" altLang="en-US" sz="1600" b="1">
+                <a:solidFill>
+                  <a:schemeClr val="accent1">
+                    <a:lumMod val="75000"/>
+                  </a:schemeClr>
+                </a:solidFill>
+              </a:rPr>
+              <a:t>indentação </a:t>
+            </a:r>
+            <a:r>
+              <a:rPr lang="pt-BR" altLang="en-US" sz="1600"/>
+              <a:t>precisa estar certa, não precisa dar um TAB, um </a:t>
+            </a:r>
+            <a:r>
+              <a:rPr lang="pt-BR" altLang="en-US" sz="1600" b="1">
+                <a:solidFill>
+                  <a:schemeClr val="accent1">
+                    <a:lumMod val="75000"/>
+                  </a:schemeClr>
+                </a:solidFill>
+              </a:rPr>
+              <a:t>espaço </a:t>
+            </a:r>
+            <a:r>
+              <a:rPr lang="pt-BR" altLang="en-US" sz="1600" b="0"/>
+              <a:t>(tecla backspace do teclado) </a:t>
+            </a:r>
+            <a:r>
+              <a:rPr lang="pt-BR" altLang="en-US" sz="1600"/>
+              <a:t>já basta.</a:t>
+            </a:r>
+            <a:endParaRPr lang="pt-BR" altLang="en-US" sz="1600"/>
+          </a:p>
+          <a:p>
+            <a:pPr marL="285750" indent="-285750" algn="just">
+              <a:buFont typeface="Arial" panose="020B0604020202020204" pitchFamily="34" charset="0"/>
+              <a:buChar char="•"/>
+            </a:pPr>
+            <a:endParaRPr lang="pt-BR" altLang="en-US" sz="1600"/>
+          </a:p>
+          <a:p>
+            <a:pPr marL="285750" indent="-285750" algn="just">
+              <a:buFont typeface="Arial" panose="020B0604020202020204" pitchFamily="34" charset="0"/>
+              <a:buChar char="•"/>
+            </a:pPr>
+            <a:r>
+              <a:rPr lang="pt-BR" altLang="en-US" sz="1600"/>
+              <a:t>Exemplo:</a:t>
+            </a:r>
+            <a:endParaRPr lang="pt-BR" altLang="en-US" sz="1600"/>
+          </a:p>
+          <a:p>
+            <a:pPr marL="285750" indent="-285750" algn="just">
+              <a:buFont typeface="Arial" panose="020B0604020202020204" pitchFamily="34" charset="0"/>
+              <a:buChar char="•"/>
+            </a:pPr>
+            <a:endParaRPr lang="pt-BR" altLang="en-US" sz="1600"/>
+          </a:p>
+          <a:p>
+            <a:pPr marL="0" indent="0" algn="just">
+              <a:buFont typeface="Arial" panose="020B0604020202020204" pitchFamily="34" charset="0"/>
+              <a:buNone/>
+            </a:pPr>
+            <a:r>
+              <a:rPr lang="pt-BR" altLang="en-US" sz="1600"/>
+              <a:t>	PastaExemplo</a:t>
+            </a:r>
+            <a:endParaRPr lang="pt-BR" altLang="en-US" sz="1600"/>
+          </a:p>
+          <a:p>
+            <a:pPr marL="0" indent="0" algn="just">
+              <a:buFont typeface="Arial" panose="020B0604020202020204" pitchFamily="34" charset="0"/>
+              <a:buNone/>
+            </a:pPr>
+            <a:r>
+              <a:rPr lang="pt-BR" altLang="en-US" sz="1600"/>
+              <a:t>	  Variavel_Na_PastaExemplo</a:t>
+            </a:r>
+            <a:endParaRPr lang="pt-BR" altLang="en-US" sz="1600"/>
+          </a:p>
+          <a:p>
+            <a:pPr marL="0" indent="0" algn="just">
+              <a:buFont typeface="Arial" panose="020B0604020202020204" pitchFamily="34" charset="0"/>
+              <a:buNone/>
+            </a:pPr>
+            <a:r>
+              <a:rPr lang="pt-BR" altLang="en-US" sz="1600"/>
+              <a:t>	OutraPasta</a:t>
+            </a:r>
+            <a:endParaRPr lang="pt-BR" altLang="en-US" sz="1600"/>
+          </a:p>
+          <a:p>
+            <a:pPr marL="0" indent="0" algn="just">
+              <a:buFont typeface="Arial" panose="020B0604020202020204" pitchFamily="34" charset="0"/>
+              <a:buNone/>
+            </a:pPr>
+            <a:r>
+              <a:rPr lang="pt-BR" altLang="en-US" sz="1600"/>
+              <a:t>	  SegundaVariavel_Na_OutraPasta</a:t>
+            </a:r>
+            <a:endParaRPr lang="pt-BR" altLang="en-US" sz="1600"/>
+          </a:p>
+          <a:p>
+            <a:pPr marL="285750" indent="-285750" algn="just">
+              <a:buFont typeface="Arial" panose="020B0604020202020204" pitchFamily="34" charset="0"/>
+              <a:buChar char="•"/>
+            </a:pPr>
+            <a:endParaRPr lang="pt-BR" altLang="en-US" sz="1600"/>
+          </a:p>
+          <a:p>
+            <a:pPr marL="285750" indent="-285750" algn="just">
+              <a:buFont typeface="Arial" panose="020B0604020202020204" pitchFamily="34" charset="0"/>
+              <a:buChar char="•"/>
+            </a:pPr>
+            <a:endParaRPr lang="pt-BR" altLang="en-US" sz="1600"/>
+          </a:p>
+          <a:p>
+            <a:pPr marL="285750" indent="-285750" algn="just">
               <a:buFont typeface="Arial" panose="020B0604020202020204" pitchFamily="34" charset="0"/>
               <a:buChar char="•"/>
             </a:pPr>
@@ -5711,7 +5826,7 @@
           <a:bodyPr/>
           <a:p>
             <a:r>
-              <a:rPr lang="pt-BR" sz="2400" b="1" i="0" strike="noStrike">
+              <a:rPr lang="pt-BR" sz="2400" b="1" i="1" strike="noStrike">
                 <a:solidFill>
                   <a:srgbClr val="00315D"/>
                 </a:solidFill>
@@ -5719,9 +5834,20 @@
                 <a:ea typeface="Arial" panose="020B0604020202020204"/>
                 <a:sym typeface="+mn-ea"/>
               </a:rPr>
-              <a:t>Parâmetros - Como criar </a:t>
-            </a:r>
-            <a:endParaRPr lang="pt-BR" altLang="en-US" sz="2400" b="1" i="0" strike="noStrike">
+              <a:t>Parâmetros</a:t>
+            </a:r>
+            <a:r>
+              <a:rPr lang="pt-BR" sz="2400" b="1" i="1" strike="noStrike">
+                <a:solidFill>
+                  <a:srgbClr val="00315D"/>
+                </a:solidFill>
+                <a:latin typeface="Arial" panose="020B0604020202020204"/>
+                <a:ea typeface="Arial" panose="020B0604020202020204"/>
+                <a:sym typeface="+mn-ea"/>
+              </a:rPr>
+              <a:t> </a:t>
+            </a:r>
+            <a:endParaRPr lang="pt-BR" altLang="en-US" sz="2400" b="1" i="1" strike="noStrike">
               <a:solidFill>
                 <a:srgbClr val="00315D"/>
               </a:solidFill>
@@ -5757,144 +5883,8 @@
             </a:pPr>
             <a:r>
               <a:rPr lang="pt-BR" altLang="en-US" sz="1600"/>
-              <a:t>Como demonstrado no vídeo, para </a:t>
-            </a:r>
-            <a:r>
-              <a:rPr lang="pt-BR" altLang="en-US" sz="1600" b="1">
-                <a:solidFill>
-                  <a:schemeClr val="accent1">
-                    <a:lumMod val="75000"/>
-                  </a:schemeClr>
-                </a:solidFill>
-              </a:rPr>
-              <a:t>criar </a:t>
-            </a:r>
-            <a:r>
-              <a:rPr lang="pt-BR" altLang="en-US" sz="1600"/>
-              <a:t>uma variavel, antes precisa criar uma </a:t>
-            </a:r>
-            <a:r>
-              <a:rPr lang="pt-BR" altLang="en-US" sz="1600" b="1">
-                <a:solidFill>
-                  <a:schemeClr val="accent1">
-                    <a:lumMod val="75000"/>
-                  </a:schemeClr>
-                </a:solidFill>
-              </a:rPr>
-              <a:t>pasta</a:t>
-            </a:r>
-            <a:r>
-              <a:rPr lang="pt-BR" altLang="en-US" sz="1600"/>
-              <a:t>. Outro ponto que é importante informar em relação a variavel, para criá-la dentro da pasta é preciso dar um espaço, ou seja, a </a:t>
-            </a:r>
-            <a:r>
-              <a:rPr lang="pt-BR" altLang="en-US" sz="1600" b="1">
-                <a:solidFill>
-                  <a:schemeClr val="accent1">
-                    <a:lumMod val="75000"/>
-                  </a:schemeClr>
-                </a:solidFill>
-              </a:rPr>
-              <a:t>indentação </a:t>
-            </a:r>
-            <a:r>
-              <a:rPr lang="pt-BR" altLang="en-US" sz="1600"/>
-              <a:t>precisa estar certa, não precisa dar um TAB, um </a:t>
-            </a:r>
-            <a:r>
-              <a:rPr lang="pt-BR" altLang="en-US" sz="1600" b="1">
-                <a:solidFill>
-                  <a:schemeClr val="accent1">
-                    <a:lumMod val="75000"/>
-                  </a:schemeClr>
-                </a:solidFill>
-              </a:rPr>
-              <a:t>espaço </a:t>
-            </a:r>
-            <a:r>
-              <a:rPr lang="pt-BR" altLang="en-US" sz="1600" b="0"/>
-              <a:t>(tecla backspace do teclado) </a:t>
-            </a:r>
-            <a:r>
-              <a:rPr lang="pt-BR" altLang="en-US" sz="1600"/>
-              <a:t>já basta.</a:t>
-            </a:r>
-            <a:endParaRPr lang="pt-BR" altLang="en-US" sz="1600"/>
-          </a:p>
-          <a:p>
-            <a:pPr marL="285750" indent="-285750" algn="just">
-              <a:buFont typeface="Arial" panose="020B0604020202020204" pitchFamily="34" charset="0"/>
-              <a:buChar char="•"/>
-            </a:pPr>
-            <a:endParaRPr lang="pt-BR" altLang="en-US" sz="1600"/>
-          </a:p>
-          <a:p>
-            <a:pPr marL="285750" indent="-285750" algn="just">
-              <a:buFont typeface="Arial" panose="020B0604020202020204" pitchFamily="34" charset="0"/>
-              <a:buChar char="•"/>
-            </a:pPr>
-            <a:r>
-              <a:rPr lang="pt-BR" altLang="en-US" sz="1600"/>
-              <a:t>Exemplo:</a:t>
-            </a:r>
-            <a:endParaRPr lang="pt-BR" altLang="en-US" sz="1600"/>
-          </a:p>
-          <a:p>
-            <a:pPr marL="285750" indent="-285750" algn="just">
-              <a:buFont typeface="Arial" panose="020B0604020202020204" pitchFamily="34" charset="0"/>
-              <a:buChar char="•"/>
-            </a:pPr>
-            <a:endParaRPr lang="pt-BR" altLang="en-US" sz="1600"/>
-          </a:p>
-          <a:p>
-            <a:pPr marL="0" indent="0" algn="just">
-              <a:buFont typeface="Arial" panose="020B0604020202020204" pitchFamily="34" charset="0"/>
-              <a:buNone/>
-            </a:pPr>
-            <a:r>
-              <a:rPr lang="pt-BR" altLang="en-US" sz="1600"/>
-              <a:t>	PastaExemplo</a:t>
-            </a:r>
-            <a:endParaRPr lang="pt-BR" altLang="en-US" sz="1600"/>
-          </a:p>
-          <a:p>
-            <a:pPr marL="0" indent="0" algn="just">
-              <a:buFont typeface="Arial" panose="020B0604020202020204" pitchFamily="34" charset="0"/>
-              <a:buNone/>
-            </a:pPr>
-            <a:r>
-              <a:rPr lang="pt-BR" altLang="en-US" sz="1600"/>
-              <a:t>	  Variavel_Na_PastaExemplo</a:t>
-            </a:r>
-            <a:endParaRPr lang="pt-BR" altLang="en-US" sz="1600"/>
-          </a:p>
-          <a:p>
-            <a:pPr marL="0" indent="0" algn="just">
-              <a:buFont typeface="Arial" panose="020B0604020202020204" pitchFamily="34" charset="0"/>
-              <a:buNone/>
-            </a:pPr>
-            <a:r>
-              <a:rPr lang="pt-BR" altLang="en-US" sz="1600"/>
-              <a:t>	OutraPasta</a:t>
-            </a:r>
-            <a:endParaRPr lang="pt-BR" altLang="en-US" sz="1600"/>
-          </a:p>
-          <a:p>
-            <a:pPr marL="0" indent="0" algn="just">
-              <a:buFont typeface="Arial" panose="020B0604020202020204" pitchFamily="34" charset="0"/>
-              <a:buNone/>
-            </a:pPr>
-            <a:r>
-              <a:rPr lang="pt-BR" altLang="en-US" sz="1600"/>
-              <a:t>	  SegundaVariavel_Na_OutraPasta</a:t>
-            </a:r>
-            <a:endParaRPr lang="pt-BR" altLang="en-US" sz="1600"/>
-          </a:p>
-          <a:p>
-            <a:pPr marL="285750" indent="-285750" algn="just">
-              <a:buFont typeface="Arial" panose="020B0604020202020204" pitchFamily="34" charset="0"/>
-              <a:buChar char="•"/>
-            </a:pPr>
+              <a:t>Após criado a variável, será preciso atribuir à base de dados. Segue o vídeo demonstrando.</a:t>
+            </a:r>
             <a:endParaRPr lang="pt-BR" altLang="en-US" sz="1600"/>
           </a:p>
           <a:p>
@@ -6144,7 +6134,7 @@
                 <a:ea typeface="Arial" panose="020B0604020202020204"/>
                 <a:sym typeface="+mn-ea"/>
               </a:rPr>
-              <a:t> </a:t>
+              <a:t> - Se atentar...</a:t>
             </a:r>
             <a:endParaRPr lang="pt-BR" altLang="en-US" sz="2400" b="1" i="1" strike="noStrike">
               <a:solidFill>
@@ -6157,6 +6147,32 @@
           </a:p>
         </p:txBody>
       </p:sp>
+      <p:pic>
+        <p:nvPicPr>
+          <p:cNvPr id="4" name="Imagem 3" descr="mensagem de erro"/>
+          <p:cNvPicPr>
+            <a:picLocks noChangeAspect="1"/>
+          </p:cNvPicPr>
+          <p:nvPr/>
+        </p:nvPicPr>
+        <p:blipFill>
+          <a:blip r:embed="rId1">
+            <a:alphaModFix amt="16000"/>
+          </a:blip>
+          <a:stretch>
+            <a:fillRect/>
+          </a:stretch>
+        </p:blipFill>
+        <p:spPr>
+          <a:xfrm>
+            <a:off x="3636010" y="0"/>
+            <a:ext cx="4351655" cy="4351655"/>
+          </a:xfrm>
+          <a:prstGeom prst="rect">
+            <a:avLst/>
+          </a:prstGeom>
+        </p:spPr>
+      </p:pic>
       <p:sp>
         <p:nvSpPr>
           <p:cNvPr id="3" name="Espaço Reservado para Conteúdo 2"/>
@@ -6170,7 +6186,7 @@
         <p:spPr>
           <a:xfrm>
             <a:off x="311785" y="1152525"/>
-            <a:ext cx="8667750" cy="3416300"/>
+            <a:ext cx="5120640" cy="3416300"/>
           </a:xfrm>
         </p:spPr>
         <p:txBody>
@@ -6182,7 +6198,61 @@
             </a:pPr>
             <a:r>
               <a:rPr lang="pt-BR" altLang="en-US" sz="1600"/>
-              <a:t>Após criado a variável, será preciso atribuir à base de dados. Segue o vídeo demonstrando.</a:t>
+              <a:t>Algo que é preciso ficar atento na hora de vincular a variável ao parâmetro da base de dados é no campo “</a:t>
+            </a:r>
+            <a:r>
+              <a:rPr lang="pt-BR" altLang="en-US" sz="1600" b="1">
+                <a:solidFill>
+                  <a:schemeClr val="accent1">
+                    <a:lumMod val="75000"/>
+                  </a:schemeClr>
+                </a:solidFill>
+              </a:rPr>
+              <a:t>Tipo de Dado</a:t>
+            </a:r>
+            <a:r>
+              <a:rPr lang="pt-BR" altLang="en-US" sz="1600"/>
+              <a:t>”. Se o dado inserido for </a:t>
+            </a:r>
+            <a:r>
+              <a:rPr lang="pt-BR" altLang="en-US" sz="1600" b="1">
+                <a:solidFill>
+                  <a:schemeClr val="accent1">
+                    <a:lumMod val="75000"/>
+                  </a:schemeClr>
+                </a:solidFill>
+              </a:rPr>
+              <a:t>inteiro</a:t>
+            </a:r>
+            <a:r>
+              <a:rPr lang="pt-BR" altLang="en-US" sz="1600"/>
+              <a:t>, e neste campo estiver </a:t>
+            </a:r>
+            <a:r>
+              <a:rPr lang="pt-BR" altLang="en-US" sz="1600" b="1">
+                <a:solidFill>
+                  <a:schemeClr val="accent1">
+                    <a:lumMod val="75000"/>
+                  </a:schemeClr>
+                </a:solidFill>
+              </a:rPr>
+              <a:t>String </a:t>
+            </a:r>
+            <a:r>
+              <a:rPr lang="pt-BR" altLang="en-US" sz="1600"/>
+              <a:t>vai dar um </a:t>
+            </a:r>
+            <a:r>
+              <a:rPr lang="pt-BR" altLang="en-US" sz="1600">
+                <a:solidFill>
+                  <a:srgbClr val="FF0000"/>
+                </a:solidFill>
+              </a:rPr>
+              <a:t>erro</a:t>
+            </a:r>
+            <a:r>
+              <a:rPr lang="pt-BR" altLang="en-US" sz="1600"/>
+              <a:t> de compatibilidade.</a:t>
             </a:r>
             <a:endParaRPr lang="pt-BR" altLang="en-US" sz="1600"/>
           </a:p>
@@ -6191,7 +6261,58 @@
               <a:buFont typeface="Arial" panose="020B0604020202020204" pitchFamily="34" charset="0"/>
               <a:buChar char="•"/>
             </a:pPr>
-            <a:endParaRPr lang="pt-BR" altLang="en-US" sz="1600"/>
+            <a:endParaRPr lang="pt-BR" altLang="en-US" sz="1600" b="0"/>
+          </a:p>
+          <a:p>
+            <a:pPr marL="285750" indent="-285750" algn="just">
+              <a:buFont typeface="Arial" panose="020B0604020202020204" pitchFamily="34" charset="0"/>
+              <a:buChar char="•"/>
+            </a:pPr>
+            <a:r>
+              <a:rPr lang="pt-BR" altLang="en-US" sz="1600" b="0"/>
+              <a:t>Outro erro comum de acontecer é deixar o campo “</a:t>
+            </a:r>
+            <a:r>
+              <a:rPr lang="pt-BR" altLang="en-US" sz="1600" b="1">
+                <a:solidFill>
+                  <a:schemeClr val="accent1">
+                    <a:lumMod val="75000"/>
+                  </a:schemeClr>
+                </a:solidFill>
+              </a:rPr>
+              <a:t>Valor</a:t>
+            </a:r>
+            <a:r>
+              <a:rPr lang="pt-BR" altLang="en-US" sz="1600" b="0"/>
+              <a:t>” vazio, não atribuindo uma variável para o parâmetro do SQL, o que implicará numa </a:t>
+            </a:r>
+            <a:r>
+              <a:rPr lang="pt-BR" altLang="en-US" sz="1600" b="0">
+                <a:solidFill>
+                  <a:srgbClr val="FF0000"/>
+                </a:solidFill>
+              </a:rPr>
+              <a:t>mensagem de erro</a:t>
+            </a:r>
+            <a:r>
+              <a:rPr lang="pt-BR" altLang="en-US" sz="1600" b="0"/>
+              <a:t> na hora da execução.</a:t>
+            </a:r>
+            <a:endParaRPr lang="pt-BR" altLang="en-US" sz="1600" b="0"/>
+          </a:p>
+          <a:p>
+            <a:pPr marL="285750" indent="-285750" algn="just">
+              <a:buFont typeface="Arial" panose="020B0604020202020204" pitchFamily="34" charset="0"/>
+              <a:buChar char="•"/>
+            </a:pPr>
+            <a:endParaRPr lang="pt-BR" altLang="en-US" sz="1600" b="0"/>
+          </a:p>
+          <a:p>
+            <a:pPr marL="285750" indent="-285750" algn="just">
+              <a:buFont typeface="Arial" panose="020B0604020202020204" pitchFamily="34" charset="0"/>
+              <a:buChar char="•"/>
+            </a:pPr>
+            <a:endParaRPr lang="pt-BR" altLang="en-US" sz="1600" b="0"/>
           </a:p>
           <a:p>
             <a:pPr marL="285750" indent="-285750" algn="just">
@@ -6337,7 +6458,7 @@
           <p:nvPr/>
         </p:nvPicPr>
         <p:blipFill>
-          <a:blip r:embed="rId1"/>
+          <a:blip r:embed="rId2"/>
           <a:stretch>
             <a:fillRect/>
           </a:stretch>
@@ -6360,6 +6481,30 @@
               </a:srgbClr>
             </a:outerShdw>
           </a:effectLst>
+        </p:spPr>
+      </p:pic>
+      <p:pic>
+        <p:nvPicPr>
+          <p:cNvPr id="5" name="Imagem 4"/>
+          <p:cNvPicPr>
+            <a:picLocks noChangeAspect="1"/>
+          </p:cNvPicPr>
+          <p:nvPr/>
+        </p:nvPicPr>
+        <p:blipFill>
+          <a:blip r:embed="rId3"/>
+          <a:stretch>
+            <a:fillRect/>
+          </a:stretch>
+        </p:blipFill>
+        <p:spPr>
+          <a:xfrm>
+            <a:off x="6156325" y="1419860"/>
+            <a:ext cx="2881630" cy="3095625"/>
+          </a:xfrm>
+          <a:prstGeom prst="rect">
+            <a:avLst/>
+          </a:prstGeom>
         </p:spPr>
       </p:pic>
     </p:spTree>
@@ -6409,7 +6554,12 @@
             <p:ph type="title"/>
           </p:nvPr>
         </p:nvSpPr>
-        <p:spPr/>
+        <p:spPr>
+          <a:xfrm>
+            <a:off x="311760" y="109680"/>
+            <a:ext cx="8520120" cy="572400"/>
+          </a:xfrm>
+        </p:spPr>
         <p:txBody>
           <a:bodyPr/>
           <a:p>
@@ -6433,7 +6583,7 @@
                 <a:ea typeface="Arial" panose="020B0604020202020204"/>
                 <a:sym typeface="+mn-ea"/>
               </a:rPr>
-              <a:t> - Se atentar...</a:t>
+              <a:t> - Verificando uma query no FAST</a:t>
             </a:r>
             <a:endParaRPr lang="pt-BR" altLang="en-US" sz="2400" b="1" i="1" strike="noStrike">
               <a:solidFill>
@@ -6446,32 +6596,6 @@
           </a:p>
         </p:txBody>
       </p:sp>
-      <p:pic>
-        <p:nvPicPr>
-          <p:cNvPr id="4" name="Imagem 3" descr="mensagem de erro"/>
-          <p:cNvPicPr>
-            <a:picLocks noChangeAspect="1"/>
-          </p:cNvPicPr>
-          <p:nvPr/>
-        </p:nvPicPr>
-        <p:blipFill>
-          <a:blip r:embed="rId1">
-            <a:alphaModFix amt="16000"/>
-          </a:blip>
-          <a:stretch>
-            <a:fillRect/>
-          </a:stretch>
-        </p:blipFill>
-        <p:spPr>
-          <a:xfrm>
-            <a:off x="3636010" y="0"/>
-            <a:ext cx="4351655" cy="4351655"/>
-          </a:xfrm>
-          <a:prstGeom prst="rect">
-            <a:avLst/>
-          </a:prstGeom>
-        </p:spPr>
-      </p:pic>
       <p:sp>
         <p:nvSpPr>
           <p:cNvPr id="3" name="Espaço Reservado para Conteúdo 2"/>
@@ -6484,8 +6608,8 @@
         </p:nvSpPr>
         <p:spPr>
           <a:xfrm>
-            <a:off x="311785" y="1152525"/>
-            <a:ext cx="5120640" cy="3416300"/>
+            <a:off x="311785" y="656590"/>
+            <a:ext cx="4800600" cy="3416300"/>
           </a:xfrm>
         </p:spPr>
         <p:txBody>
@@ -6497,63 +6621,33 @@
             </a:pPr>
             <a:r>
               <a:rPr lang="pt-BR" altLang="en-US" sz="1600"/>
-              <a:t>Algo que é preciso ficar atento na hora de vincular a variável ao parâmetro da base de dados é no campo “</a:t>
-            </a:r>
-            <a:r>
-              <a:rPr lang="pt-BR" altLang="en-US" sz="1600" b="1">
-                <a:solidFill>
-                  <a:schemeClr val="accent1">
-                    <a:lumMod val="75000"/>
-                  </a:schemeClr>
-                </a:solidFill>
-              </a:rPr>
-              <a:t>Tipo de Dado</a:t>
-            </a:r>
-            <a:r>
-              <a:rPr lang="pt-BR" altLang="en-US" sz="1600"/>
-              <a:t>”. Se o dado inserido for </a:t>
-            </a:r>
-            <a:r>
-              <a:rPr lang="pt-BR" altLang="en-US" sz="1600" b="1">
-                <a:solidFill>
-                  <a:schemeClr val="accent1">
-                    <a:lumMod val="75000"/>
-                  </a:schemeClr>
-                </a:solidFill>
-              </a:rPr>
-              <a:t>inteiro</a:t>
-            </a:r>
-            <a:r>
-              <a:rPr lang="pt-BR" altLang="en-US" sz="1600"/>
-              <a:t>, e neste campo estiver </a:t>
-            </a:r>
-            <a:r>
-              <a:rPr lang="pt-BR" altLang="en-US" sz="1600" b="1">
-                <a:solidFill>
-                  <a:schemeClr val="accent1">
-                    <a:lumMod val="75000"/>
-                  </a:schemeClr>
-                </a:solidFill>
-              </a:rPr>
-              <a:t>String </a:t>
-            </a:r>
-            <a:r>
-              <a:rPr lang="pt-BR" altLang="en-US" sz="1600"/>
-              <a:t>vai dar um </a:t>
-            </a:r>
-            <a:r>
-              <a:rPr lang="pt-BR" altLang="en-US" sz="1600">
-                <a:solidFill>
-                  <a:srgbClr val="FF0000"/>
-                </a:solidFill>
-              </a:rPr>
-              <a:t>erro</a:t>
-            </a:r>
-            <a:r>
-              <a:rPr lang="pt-BR" altLang="en-US" sz="1600"/>
-              <a:t> de compatibilidade.</a:t>
-            </a:r>
-            <a:endParaRPr lang="pt-BR" altLang="en-US" sz="1600"/>
+              <a:t>Como foi dito anteriormente, para verificar se a consulta SQL está rodando, o nome da base de dados precisar estar em </a:t>
+            </a:r>
+            <a:r>
+              <a:rPr lang="pt-BR" altLang="en-US" sz="1600" b="1"/>
+              <a:t>negrito </a:t>
+            </a:r>
+            <a:r>
+              <a:rPr lang="pt-BR" altLang="en-US" sz="1600" b="0"/>
+              <a:t>no menu lateral direito. Mas quando se tem parâmetros, existe um procedimento a mais que deve ser feito para que o menu fique em </a:t>
+            </a:r>
+            <a:r>
+              <a:rPr lang="pt-BR" altLang="en-US" sz="1600" b="1"/>
+              <a:t>negrito</a:t>
+            </a:r>
+            <a:r>
+              <a:rPr lang="pt-BR" altLang="en-US" sz="1600" b="0"/>
+              <a:t>. É preciso clicar nos 3 pontos do campo “Params” das propriedades da base de dados, e na tela que se abrir clicar em “ok”. Caso ainda não fique em </a:t>
+            </a:r>
+            <a:r>
+              <a:rPr lang="pt-BR" altLang="en-US" sz="1600" b="1"/>
+              <a:t>negrito </a:t>
+            </a:r>
+            <a:r>
+              <a:rPr lang="pt-BR" altLang="en-US" sz="1600" b="0"/>
+              <a:t>verifique a query / parâmetro.</a:t>
+            </a:r>
+            <a:endParaRPr lang="pt-BR" altLang="en-US" sz="1600" b="0"/>
           </a:p>
           <a:p>
             <a:pPr marL="285750" indent="-285750" algn="just">
@@ -6569,55 +6663,16 @@
             </a:pPr>
             <a:r>
               <a:rPr lang="pt-BR" altLang="en-US" sz="1600" b="0"/>
-              <a:t>Outro erro comum de acontecer é deixar o campo “</a:t>
-            </a:r>
-            <a:r>
-              <a:rPr lang="pt-BR" altLang="en-US" sz="1600" b="1">
-                <a:solidFill>
-                  <a:schemeClr val="accent1">
-                    <a:lumMod val="75000"/>
-                  </a:schemeClr>
-                </a:solidFill>
-              </a:rPr>
-              <a:t>Valor</a:t>
+              <a:t>É importante deixar as bases em </a:t>
+            </a:r>
+            <a:r>
+              <a:rPr lang="pt-BR" altLang="en-US" sz="1600" b="1"/>
+              <a:t>negrito </a:t>
             </a:r>
             <a:r>
               <a:rPr lang="pt-BR" altLang="en-US" sz="1600" b="0"/>
-              <a:t>” vazio, não atribuindo uma variável para o parâmetro do SQL, o que implicará numa </a:t>
-            </a:r>
-            <a:r>
-              <a:rPr lang="pt-BR" altLang="en-US" sz="1600" b="0">
-                <a:solidFill>
-                  <a:srgbClr val="FF0000"/>
-                </a:solidFill>
-              </a:rPr>
-              <a:t>mensagem de erro</a:t>
-            </a:r>
-            <a:r>
-              <a:rPr lang="pt-BR" altLang="en-US" sz="1600" b="0"/>
-              <a:t> na hora da execução.</a:t>
-            </a:r>
-            <a:endParaRPr lang="pt-BR" altLang="en-US" sz="1600" b="0"/>
-          </a:p>
-          <a:p>
-            <a:pPr marL="285750" indent="-285750" algn="just">
-              <a:buFont typeface="Arial" panose="020B0604020202020204" pitchFamily="34" charset="0"/>
-              <a:buChar char="•"/>
-            </a:pPr>
-            <a:endParaRPr lang="pt-BR" altLang="en-US" sz="1600" b="0"/>
-          </a:p>
-          <a:p>
-            <a:pPr marL="285750" indent="-285750" algn="just">
-              <a:buFont typeface="Arial" panose="020B0604020202020204" pitchFamily="34" charset="0"/>
-              <a:buChar char="•"/>
-            </a:pPr>
-            <a:endParaRPr lang="pt-BR" altLang="en-US" sz="1600" b="0"/>
-          </a:p>
-          <a:p>
-            <a:pPr marL="285750" indent="-285750" algn="just">
-              <a:buFont typeface="Arial" panose="020B0604020202020204" pitchFamily="34" charset="0"/>
-              <a:buChar char="•"/>
-            </a:pPr>
+              <a:t>no menu lateral, para você se certificar que o FAST está rodando as query e trazendo os campos.</a:t>
+            </a:r>
             <a:endParaRPr lang="pt-BR" altLang="en-US" sz="1600" b="0"/>
           </a:p>
         </p:txBody>
@@ -6757,7 +6812,7 @@
           <p:nvPr/>
         </p:nvPicPr>
         <p:blipFill>
-          <a:blip r:embed="rId2"/>
+          <a:blip r:embed="rId1"/>
           <a:stretch>
             <a:fillRect/>
           </a:stretch>
@@ -6782,24 +6837,140 @@
           </a:effectLst>
         </p:spPr>
       </p:pic>
+      <p:sp>
+        <p:nvSpPr>
+          <p:cNvPr id="230" name="CaixaDeTexto 1"/>
+          <p:cNvSpPr/>
+          <p:nvPr/>
+        </p:nvSpPr>
+        <p:spPr>
+          <a:xfrm>
+            <a:off x="5625000" y="3435840"/>
+            <a:ext cx="3206880" cy="1073785"/>
+          </a:xfrm>
+          <a:prstGeom prst="rect">
+            <a:avLst/>
+          </a:prstGeom>
+          <a:gradFill rotWithShape="0">
+            <a:gsLst>
+              <a:gs pos="0">
+                <a:srgbClr val="4889F4"/>
+              </a:gs>
+              <a:gs pos="100000">
+                <a:srgbClr val="8EB6F8"/>
+              </a:gs>
+            </a:gsLst>
+            <a:lin ang="16200000"/>
+          </a:gradFill>
+          <a:ln w="0">
+            <a:noFill/>
+          </a:ln>
+        </p:spPr>
+        <p:style>
+          <a:lnRef idx="0">
+            <a:srgbClr val="FFFFFF"/>
+          </a:lnRef>
+          <a:fillRef idx="0">
+            <a:srgbClr val="FFFFFF"/>
+          </a:fillRef>
+          <a:effectRef idx="0">
+            <a:srgbClr val="FFFFFF"/>
+          </a:effectRef>
+          <a:fontRef idx="minor"/>
+        </p:style>
+        <p:txBody>
+          <a:bodyPr lIns="90000" tIns="45000" rIns="90000" bIns="45000" anchor="t">
+            <a:spAutoFit/>
+          </a:bodyPr>
+          <a:p>
+            <a:pPr algn="ctr">
+              <a:lnSpc>
+                <a:spcPct val="100000"/>
+              </a:lnSpc>
+            </a:pPr>
+            <a:endParaRPr lang="pt-BR" sz="800" b="0" strike="noStrike" spc="-1">
+              <a:solidFill>
+                <a:srgbClr val="000000"/>
+              </a:solidFill>
+              <a:latin typeface="Arial" panose="020B0604020202020204"/>
+            </a:endParaRPr>
+          </a:p>
+          <a:p>
+            <a:pPr algn="ctr">
+              <a:lnSpc>
+                <a:spcPct val="100000"/>
+              </a:lnSpc>
+            </a:pPr>
+            <a:r>
+              <a:rPr lang="pt-BR" sz="1600" b="1" strike="noStrike" spc="-1">
+                <a:solidFill>
+                  <a:schemeClr val="lt1"/>
+                </a:solidFill>
+                <a:latin typeface="Arial" panose="020B0604020202020204"/>
+                <a:ea typeface="Arial" panose="020B0604020202020204"/>
+              </a:rPr>
+              <a:t>OBS: antes de clicar em “</a:t>
+            </a:r>
+            <a:r>
+              <a:rPr lang="pt-BR" sz="1600" b="1" strike="noStrike" spc="-1">
+                <a:solidFill>
+                  <a:srgbClr val="FF0000"/>
+                </a:solidFill>
+                <a:latin typeface="Arial" panose="020B0604020202020204"/>
+                <a:ea typeface="Arial" panose="020B0604020202020204"/>
+              </a:rPr>
+              <a:t>ok</a:t>
+            </a:r>
+            <a:r>
+              <a:rPr lang="pt-BR" sz="1600" b="1" strike="noStrike" spc="-1">
+                <a:solidFill>
+                  <a:schemeClr val="lt1"/>
+                </a:solidFill>
+                <a:latin typeface="Arial" panose="020B0604020202020204"/>
+                <a:ea typeface="Arial" panose="020B0604020202020204"/>
+              </a:rPr>
+              <a:t>” verificar se os parâmetros estão corretos.</a:t>
+            </a:r>
+            <a:endParaRPr lang="pt-BR" sz="1600" b="0" strike="noStrike" spc="-1">
+              <a:solidFill>
+                <a:srgbClr val="000000"/>
+              </a:solidFill>
+              <a:latin typeface="Arial" panose="020B0604020202020204"/>
+            </a:endParaRPr>
+          </a:p>
+          <a:p>
+            <a:pPr algn="ctr">
+              <a:lnSpc>
+                <a:spcPct val="100000"/>
+              </a:lnSpc>
+            </a:pPr>
+            <a:endParaRPr lang="pt-BR" sz="800" b="0" strike="noStrike" spc="-1">
+              <a:solidFill>
+                <a:srgbClr val="000000"/>
+              </a:solidFill>
+              <a:latin typeface="Arial" panose="020B0604020202020204"/>
+            </a:endParaRPr>
+          </a:p>
+        </p:txBody>
+      </p:sp>
       <p:pic>
         <p:nvPicPr>
-          <p:cNvPr id="5" name="Imagem 4"/>
+          <p:cNvPr id="6" name="Imagem 5"/>
           <p:cNvPicPr>
             <a:picLocks noChangeAspect="1"/>
           </p:cNvPicPr>
           <p:nvPr/>
         </p:nvPicPr>
         <p:blipFill>
-          <a:blip r:embed="rId3"/>
+          <a:blip r:embed="rId2"/>
           <a:stretch>
             <a:fillRect/>
           </a:stretch>
         </p:blipFill>
         <p:spPr>
           <a:xfrm>
-            <a:off x="6156325" y="1419860"/>
-            <a:ext cx="2881630" cy="3095625"/>
+            <a:off x="5292090" y="699770"/>
+            <a:ext cx="3683635" cy="2603500"/>
           </a:xfrm>
           <a:prstGeom prst="rect">
             <a:avLst/>
@@ -6823,2840 +6994,6 @@
       </p:transition>
     </mc:Fallback>
   </mc:AlternateContent>
-  <p:timing>
-    <p:tnLst>
-      <p:par>
-        <p:cTn id="1" dur="indefinite" restart="never" nodeType="tmRoot"/>
-      </p:par>
-    </p:tnLst>
-  </p:timing>
-</p:sld>
-</file>
-
-<file path=ppt/slides/slide14.xml><?xml version="1.0" encoding="utf-8"?>
-<p:sld xmlns:a="http://schemas.openxmlformats.org/drawingml/2006/main" xmlns:r="http://schemas.openxmlformats.org/officeDocument/2006/relationships" xmlns:p="http://schemas.openxmlformats.org/presentationml/2006/main">
-  <p:cSld>
-    <p:spTree>
-      <p:nvGrpSpPr>
-        <p:cNvPr id="1" name=""/>
-        <p:cNvGrpSpPr/>
-        <p:nvPr/>
-      </p:nvGrpSpPr>
-      <p:grpSpPr/>
-      <p:sp>
-        <p:nvSpPr>
-          <p:cNvPr id="2" name="Título 1"/>
-          <p:cNvSpPr>
-            <a:spLocks noGrp="1"/>
-          </p:cNvSpPr>
-          <p:nvPr>
-            <p:ph type="title"/>
-          </p:nvPr>
-        </p:nvSpPr>
-        <p:spPr>
-          <a:xfrm>
-            <a:off x="311760" y="109680"/>
-            <a:ext cx="8520120" cy="572400"/>
-          </a:xfrm>
-        </p:spPr>
-        <p:txBody>
-          <a:bodyPr/>
-          <a:p>
-            <a:r>
-              <a:rPr lang="pt-BR" sz="2400" b="1" i="1" strike="noStrike">
-                <a:solidFill>
-                  <a:srgbClr val="00315D"/>
-                </a:solidFill>
-                <a:latin typeface="Arial" panose="020B0604020202020204"/>
-                <a:ea typeface="Arial" panose="020B0604020202020204"/>
-                <a:sym typeface="+mn-ea"/>
-              </a:rPr>
-              <a:t>Parâmetros</a:t>
-            </a:r>
-            <a:r>
-              <a:rPr lang="pt-BR" sz="2400" b="1" i="1" strike="noStrike">
-                <a:solidFill>
-                  <a:srgbClr val="00315D"/>
-                </a:solidFill>
-                <a:latin typeface="Arial" panose="020B0604020202020204"/>
-                <a:ea typeface="Arial" panose="020B0604020202020204"/>
-                <a:sym typeface="+mn-ea"/>
-              </a:rPr>
-              <a:t> - Verificando uma query no FAST</a:t>
-            </a:r>
-            <a:endParaRPr lang="pt-BR" altLang="en-US" sz="2400" b="1" i="1" strike="noStrike">
-              <a:solidFill>
-                <a:srgbClr val="00315D"/>
-              </a:solidFill>
-              <a:latin typeface="Arial" panose="020B0604020202020204"/>
-              <a:ea typeface="Arial" panose="020B0604020202020204"/>
-              <a:sym typeface="+mn-ea"/>
-            </a:endParaRPr>
-          </a:p>
-        </p:txBody>
-      </p:sp>
-      <p:sp>
-        <p:nvSpPr>
-          <p:cNvPr id="3" name="Espaço Reservado para Conteúdo 2"/>
-          <p:cNvSpPr>
-            <a:spLocks noGrp="1"/>
-          </p:cNvSpPr>
-          <p:nvPr>
-            <p:ph/>
-          </p:nvPr>
-        </p:nvSpPr>
-        <p:spPr>
-          <a:xfrm>
-            <a:off x="311785" y="656590"/>
-            <a:ext cx="4800600" cy="3416300"/>
-          </a:xfrm>
-        </p:spPr>
-        <p:txBody>
-          <a:bodyPr/>
-          <a:p>
-            <a:pPr marL="285750" indent="-285750" algn="just">
-              <a:buFont typeface="Arial" panose="020B0604020202020204" pitchFamily="34" charset="0"/>
-              <a:buChar char="•"/>
-            </a:pPr>
-            <a:r>
-              <a:rPr lang="pt-BR" altLang="en-US" sz="1600"/>
-              <a:t>Como foi dito anteriormente, para verificar se a consulta SQL está rodando, o nome da base de dados precisar estar em </a:t>
-            </a:r>
-            <a:r>
-              <a:rPr lang="pt-BR" altLang="en-US" sz="1600" b="1"/>
-              <a:t>negrito </a:t>
-            </a:r>
-            <a:r>
-              <a:rPr lang="pt-BR" altLang="en-US" sz="1600" b="0"/>
-              <a:t>no menu lateral direito. Mas quando se tem parâmetros, existe um procedimento a mais que deve ser feito para que o menu fique em </a:t>
-            </a:r>
-            <a:r>
-              <a:rPr lang="pt-BR" altLang="en-US" sz="1600" b="1"/>
-              <a:t>negrito</a:t>
-            </a:r>
-            <a:r>
-              <a:rPr lang="pt-BR" altLang="en-US" sz="1600" b="0"/>
-              <a:t>. É preciso clicar nos 3 pontos do campo “Params” das propriedades da base de dados, e na tela que se abrir clicar em “ok”. Caso ainda não fique em </a:t>
-            </a:r>
-            <a:r>
-              <a:rPr lang="pt-BR" altLang="en-US" sz="1600" b="1"/>
-              <a:t>negrito </a:t>
-            </a:r>
-            <a:r>
-              <a:rPr lang="pt-BR" altLang="en-US" sz="1600" b="0"/>
-              <a:t>verifique a query / parâmetro.</a:t>
-            </a:r>
-            <a:endParaRPr lang="pt-BR" altLang="en-US" sz="1600" b="0"/>
-          </a:p>
-          <a:p>
-            <a:pPr marL="285750" indent="-285750" algn="just">
-              <a:buFont typeface="Arial" panose="020B0604020202020204" pitchFamily="34" charset="0"/>
-              <a:buChar char="•"/>
-            </a:pPr>
-            <a:endParaRPr lang="pt-BR" altLang="en-US" sz="1600" b="0"/>
-          </a:p>
-          <a:p>
-            <a:pPr marL="285750" indent="-285750" algn="just">
-              <a:buFont typeface="Arial" panose="020B0604020202020204" pitchFamily="34" charset="0"/>
-              <a:buChar char="•"/>
-            </a:pPr>
-            <a:r>
-              <a:rPr lang="pt-BR" altLang="en-US" sz="1600" b="0"/>
-              <a:t>É importante deixar as bases em </a:t>
-            </a:r>
-            <a:r>
-              <a:rPr lang="pt-BR" altLang="en-US" sz="1600" b="1"/>
-              <a:t>negrito </a:t>
-            </a:r>
-            <a:r>
-              <a:rPr lang="pt-BR" altLang="en-US" sz="1600" b="0"/>
-              <a:t>no menu lateral, para você se certificar que o FAST está rodando as query e trazendo os campos.</a:t>
-            </a:r>
-            <a:endParaRPr lang="pt-BR" altLang="en-US" sz="1600" b="0"/>
-          </a:p>
-        </p:txBody>
-      </p:sp>
-      <p:sp>
-        <p:nvSpPr>
-          <p:cNvPr id="112" name="Google Shape;97;p17"/>
-          <p:cNvSpPr/>
-          <p:nvPr/>
-        </p:nvSpPr>
-        <p:spPr>
-          <a:xfrm flipH="1">
-            <a:off x="-720" y="4570920"/>
-            <a:ext cx="9143640" cy="572400"/>
-          </a:xfrm>
-          <a:prstGeom prst="rtTriangle">
-            <a:avLst/>
-          </a:prstGeom>
-          <a:gradFill rotWithShape="0">
-            <a:gsLst>
-              <a:gs pos="0">
-                <a:srgbClr val="DFE9FB"/>
-              </a:gs>
-              <a:gs pos="100000">
-                <a:srgbClr val="6E9BE7"/>
-              </a:gs>
-            </a:gsLst>
-            <a:lin ang="5394000"/>
-          </a:gradFill>
-          <a:ln w="0">
-            <a:noFill/>
-          </a:ln>
-        </p:spPr>
-        <p:style>
-          <a:lnRef idx="0">
-            <a:srgbClr val="FFFFFF"/>
-          </a:lnRef>
-          <a:fillRef idx="0">
-            <a:srgbClr val="FFFFFF"/>
-          </a:fillRef>
-          <a:effectRef idx="0">
-            <a:srgbClr val="FFFFFF"/>
-          </a:effectRef>
-          <a:fontRef idx="minor"/>
-        </p:style>
-        <p:txBody>
-          <a:bodyPr tIns="91440" bIns="91440" anchor="ctr">
-            <a:noAutofit/>
-          </a:bodyPr>
-          <a:p>
-            <a:pPr>
-              <a:lnSpc>
-                <a:spcPct val="100000"/>
-              </a:lnSpc>
-              <a:tabLst>
-                <a:tab pos="0" algn="l"/>
-              </a:tabLst>
-            </a:pPr>
-            <a:endParaRPr lang="pt-BR" sz="1400" b="0" strike="noStrike" spc="-1">
-              <a:solidFill>
-                <a:srgbClr val="000000"/>
-              </a:solidFill>
-              <a:latin typeface="Arial" panose="020B0604020202020204"/>
-              <a:ea typeface="Arial" panose="020B0604020202020204"/>
-            </a:endParaRPr>
-          </a:p>
-        </p:txBody>
-      </p:sp>
-      <p:sp>
-        <p:nvSpPr>
-          <p:cNvPr id="113" name="Google Shape;98;p17"/>
-          <p:cNvSpPr/>
-          <p:nvPr/>
-        </p:nvSpPr>
-        <p:spPr>
-          <a:xfrm>
-            <a:off x="0" y="4570920"/>
-            <a:ext cx="9143640" cy="572400"/>
-          </a:xfrm>
-          <a:prstGeom prst="rtTriangle">
-            <a:avLst/>
-          </a:prstGeom>
-          <a:gradFill rotWithShape="0">
-            <a:gsLst>
-              <a:gs pos="0">
-                <a:srgbClr val="00315D"/>
-              </a:gs>
-              <a:gs pos="100000">
-                <a:srgbClr val="1155CC"/>
-              </a:gs>
-            </a:gsLst>
-            <a:lin ang="2700000"/>
-          </a:gradFill>
-          <a:ln w="0">
-            <a:noFill/>
-          </a:ln>
-        </p:spPr>
-        <p:style>
-          <a:lnRef idx="0">
-            <a:srgbClr val="FFFFFF"/>
-          </a:lnRef>
-          <a:fillRef idx="0">
-            <a:srgbClr val="FFFFFF"/>
-          </a:fillRef>
-          <a:effectRef idx="0">
-            <a:srgbClr val="FFFFFF"/>
-          </a:effectRef>
-          <a:fontRef idx="minor"/>
-        </p:style>
-        <p:txBody>
-          <a:bodyPr tIns="91440" bIns="91440" anchor="ctr">
-            <a:noAutofit/>
-          </a:bodyPr>
-          <a:p>
-            <a:pPr>
-              <a:lnSpc>
-                <a:spcPct val="100000"/>
-              </a:lnSpc>
-              <a:tabLst>
-                <a:tab pos="0" algn="l"/>
-              </a:tabLst>
-            </a:pPr>
-            <a:endParaRPr lang="pt-BR" sz="1400" b="0" strike="noStrike" spc="-1">
-              <a:solidFill>
-                <a:srgbClr val="000000"/>
-              </a:solidFill>
-              <a:latin typeface="Arial" panose="020B0604020202020204"/>
-              <a:ea typeface="Arial" panose="020B0604020202020204"/>
-            </a:endParaRPr>
-          </a:p>
-        </p:txBody>
-      </p:sp>
-      <p:pic>
-        <p:nvPicPr>
-          <p:cNvPr id="114" name="Google Shape;99;p17"/>
-          <p:cNvPicPr/>
-          <p:nvPr/>
-        </p:nvPicPr>
-        <p:blipFill>
-          <a:blip r:embed="rId1"/>
-          <a:stretch>
-            <a:fillRect/>
-          </a:stretch>
-        </p:blipFill>
-        <p:spPr>
-          <a:xfrm>
-            <a:off x="117000" y="4700520"/>
-            <a:ext cx="1223280" cy="466920"/>
-          </a:xfrm>
-          <a:prstGeom prst="rect">
-            <a:avLst/>
-          </a:prstGeom>
-          <a:ln w="0">
-            <a:noFill/>
-          </a:ln>
-          <a:effectLst>
-            <a:outerShdw blurRad="57240" dist="19080" dir="5400000" algn="bl" rotWithShape="0">
-              <a:srgbClr val="000000">
-                <a:alpha val="50000"/>
-              </a:srgbClr>
-            </a:outerShdw>
-          </a:effectLst>
-        </p:spPr>
-      </p:pic>
-      <p:sp>
-        <p:nvSpPr>
-          <p:cNvPr id="230" name="CaixaDeTexto 1"/>
-          <p:cNvSpPr/>
-          <p:nvPr/>
-        </p:nvSpPr>
-        <p:spPr>
-          <a:xfrm>
-            <a:off x="5625000" y="3435840"/>
-            <a:ext cx="3206880" cy="1073785"/>
-          </a:xfrm>
-          <a:prstGeom prst="rect">
-            <a:avLst/>
-          </a:prstGeom>
-          <a:gradFill rotWithShape="0">
-            <a:gsLst>
-              <a:gs pos="0">
-                <a:srgbClr val="4889F4"/>
-              </a:gs>
-              <a:gs pos="100000">
-                <a:srgbClr val="8EB6F8"/>
-              </a:gs>
-            </a:gsLst>
-            <a:lin ang="16200000"/>
-          </a:gradFill>
-          <a:ln w="0">
-            <a:noFill/>
-          </a:ln>
-        </p:spPr>
-        <p:style>
-          <a:lnRef idx="0">
-            <a:srgbClr val="FFFFFF"/>
-          </a:lnRef>
-          <a:fillRef idx="0">
-            <a:srgbClr val="FFFFFF"/>
-          </a:fillRef>
-          <a:effectRef idx="0">
-            <a:srgbClr val="FFFFFF"/>
-          </a:effectRef>
-          <a:fontRef idx="minor"/>
-        </p:style>
-        <p:txBody>
-          <a:bodyPr lIns="90000" tIns="45000" rIns="90000" bIns="45000" anchor="t">
-            <a:spAutoFit/>
-          </a:bodyPr>
-          <a:p>
-            <a:pPr algn="ctr">
-              <a:lnSpc>
-                <a:spcPct val="100000"/>
-              </a:lnSpc>
-            </a:pPr>
-            <a:endParaRPr lang="pt-BR" sz="800" b="0" strike="noStrike" spc="-1">
-              <a:solidFill>
-                <a:srgbClr val="000000"/>
-              </a:solidFill>
-              <a:latin typeface="Arial" panose="020B0604020202020204"/>
-            </a:endParaRPr>
-          </a:p>
-          <a:p>
-            <a:pPr algn="ctr">
-              <a:lnSpc>
-                <a:spcPct val="100000"/>
-              </a:lnSpc>
-            </a:pPr>
-            <a:r>
-              <a:rPr lang="pt-BR" sz="1600" b="1" strike="noStrike" spc="-1">
-                <a:solidFill>
-                  <a:schemeClr val="lt1"/>
-                </a:solidFill>
-                <a:latin typeface="Arial" panose="020B0604020202020204"/>
-                <a:ea typeface="Arial" panose="020B0604020202020204"/>
-              </a:rPr>
-              <a:t>OBS: antes de clicar em “</a:t>
-            </a:r>
-            <a:r>
-              <a:rPr lang="pt-BR" sz="1600" b="1" strike="noStrike" spc="-1">
-                <a:solidFill>
-                  <a:srgbClr val="FF0000"/>
-                </a:solidFill>
-                <a:latin typeface="Arial" panose="020B0604020202020204"/>
-                <a:ea typeface="Arial" panose="020B0604020202020204"/>
-              </a:rPr>
-              <a:t>ok</a:t>
-            </a:r>
-            <a:r>
-              <a:rPr lang="pt-BR" sz="1600" b="1" strike="noStrike" spc="-1">
-                <a:solidFill>
-                  <a:schemeClr val="lt1"/>
-                </a:solidFill>
-                <a:latin typeface="Arial" panose="020B0604020202020204"/>
-                <a:ea typeface="Arial" panose="020B0604020202020204"/>
-              </a:rPr>
-              <a:t>” verificar se os parâmetros estão corretos.</a:t>
-            </a:r>
-            <a:endParaRPr lang="pt-BR" sz="1600" b="0" strike="noStrike" spc="-1">
-              <a:solidFill>
-                <a:srgbClr val="000000"/>
-              </a:solidFill>
-              <a:latin typeface="Arial" panose="020B0604020202020204"/>
-            </a:endParaRPr>
-          </a:p>
-          <a:p>
-            <a:pPr algn="ctr">
-              <a:lnSpc>
-                <a:spcPct val="100000"/>
-              </a:lnSpc>
-            </a:pPr>
-            <a:endParaRPr lang="pt-BR" sz="800" b="0" strike="noStrike" spc="-1">
-              <a:solidFill>
-                <a:srgbClr val="000000"/>
-              </a:solidFill>
-              <a:latin typeface="Arial" panose="020B0604020202020204"/>
-            </a:endParaRPr>
-          </a:p>
-        </p:txBody>
-      </p:sp>
-      <p:pic>
-        <p:nvPicPr>
-          <p:cNvPr id="6" name="Imagem 5"/>
-          <p:cNvPicPr>
-            <a:picLocks noChangeAspect="1"/>
-          </p:cNvPicPr>
-          <p:nvPr/>
-        </p:nvPicPr>
-        <p:blipFill>
-          <a:blip r:embed="rId2"/>
-          <a:stretch>
-            <a:fillRect/>
-          </a:stretch>
-        </p:blipFill>
-        <p:spPr>
-          <a:xfrm>
-            <a:off x="5292090" y="699770"/>
-            <a:ext cx="3683635" cy="2603500"/>
-          </a:xfrm>
-          <a:prstGeom prst="rect">
-            <a:avLst/>
-          </a:prstGeom>
-        </p:spPr>
-      </p:pic>
-    </p:spTree>
-  </p:cSld>
-  <p:clrMapOvr>
-    <a:masterClrMapping/>
-  </p:clrMapOvr>
-  <mc:AlternateContent xmlns:mc="http://schemas.openxmlformats.org/markup-compatibility/2006">
-    <mc:Choice xmlns:p14="http://schemas.microsoft.com/office/powerpoint/2010/main" Requires="p14">
-      <p:transition spd="slow" p14:dur="1000">
-        <p:wipe/>
-      </p:transition>
-    </mc:Choice>
-    <mc:Fallback>
-      <p:transition spd="slow">
-        <p:wipe/>
-      </p:transition>
-    </mc:Fallback>
-  </mc:AlternateContent>
-  <p:timing>
-    <p:tnLst>
-      <p:par>
-        <p:cTn id="1" dur="indefinite" restart="never" nodeType="tmRoot"/>
-      </p:par>
-    </p:tnLst>
-  </p:timing>
-</p:sld>
-</file>
-
-<file path=ppt/slides/slide15.xml><?xml version="1.0" encoding="utf-8"?>
-<p:sld xmlns:a="http://schemas.openxmlformats.org/drawingml/2006/main" xmlns:r="http://schemas.openxmlformats.org/officeDocument/2006/relationships" xmlns:p="http://schemas.openxmlformats.org/presentationml/2006/main">
-  <p:cSld>
-    <p:spTree>
-      <p:nvGrpSpPr>
-        <p:cNvPr id="1" name=""/>
-        <p:cNvGrpSpPr/>
-        <p:nvPr/>
-      </p:nvGrpSpPr>
-      <p:grpSpPr/>
-      <p:sp>
-        <p:nvSpPr>
-          <p:cNvPr id="2" name="Título 1"/>
-          <p:cNvSpPr>
-            <a:spLocks noGrp="1"/>
-          </p:cNvSpPr>
-          <p:nvPr>
-            <p:ph type="title"/>
-          </p:nvPr>
-        </p:nvSpPr>
-        <p:spPr/>
-        <p:txBody>
-          <a:bodyPr/>
-          <a:p>
-            <a:r>
-              <a:rPr lang="pt-BR" b="1" i="1" strike="noStrike">
-                <a:solidFill>
-                  <a:srgbClr val="00315D"/>
-                </a:solidFill>
-                <a:latin typeface="Arial" panose="020B0604020202020204"/>
-                <a:ea typeface="Arial" panose="020B0604020202020204"/>
-                <a:sym typeface="+mn-ea"/>
-              </a:rPr>
-              <a:t>Boas Práticas</a:t>
-            </a:r>
-            <a:endParaRPr lang="pt-BR" altLang="en-US"/>
-          </a:p>
-        </p:txBody>
-      </p:sp>
-      <p:sp>
-        <p:nvSpPr>
-          <p:cNvPr id="3" name="Espaço Reservado para Conteúdo 2"/>
-          <p:cNvSpPr>
-            <a:spLocks noGrp="1"/>
-          </p:cNvSpPr>
-          <p:nvPr>
-            <p:ph/>
-          </p:nvPr>
-        </p:nvSpPr>
-        <p:spPr>
-          <a:xfrm>
-            <a:off x="4121150" y="1152525"/>
-            <a:ext cx="4745990" cy="3416300"/>
-          </a:xfrm>
-        </p:spPr>
-        <p:txBody>
-          <a:bodyPr/>
-          <a:p>
-            <a:pPr marL="171450" indent="-171450" algn="just">
-              <a:buFont typeface="Arial" panose="020B0604020202020204" pitchFamily="34" charset="0"/>
-              <a:buChar char="•"/>
-            </a:pPr>
-            <a:r>
-              <a:rPr lang="pt-BR" b="0" strike="noStrike">
-                <a:solidFill>
-                  <a:srgbClr val="3B3B3B"/>
-                </a:solidFill>
-                <a:latin typeface="Arial" panose="020B0604020202020204"/>
-                <a:ea typeface="Arial" panose="020B0604020202020204"/>
-                <a:sym typeface="+mn-ea"/>
-              </a:rPr>
-              <a:t>Agora que foi dado uma introdução inicial do que vem a ser o FAST, e como funciona, é importante destacar algumas boas práticas, para na hora de iníciar um relatório, ou ter que fazer alguma alteração em um relatório, fazer da melhor forma possível.</a:t>
-            </a:r>
-            <a:endParaRPr lang="pt-BR" altLang="en-US"/>
-          </a:p>
-        </p:txBody>
-      </p:sp>
-      <p:pic>
-        <p:nvPicPr>
-          <p:cNvPr id="100" name="Imagem 99"/>
-          <p:cNvPicPr/>
-          <p:nvPr/>
-        </p:nvPicPr>
-        <p:blipFill>
-          <a:blip r:embed="rId1"/>
-          <a:stretch>
-            <a:fillRect/>
-          </a:stretch>
-        </p:blipFill>
-        <p:spPr>
-          <a:xfrm>
-            <a:off x="326390" y="1131570"/>
-            <a:ext cx="3629660" cy="3119120"/>
-          </a:xfrm>
-          <a:prstGeom prst="rect">
-            <a:avLst/>
-          </a:prstGeom>
-          <a:noFill/>
-          <a:ln w="9525">
-            <a:noFill/>
-          </a:ln>
-        </p:spPr>
-      </p:pic>
-      <p:sp>
-        <p:nvSpPr>
-          <p:cNvPr id="112" name="Google Shape;97;p17"/>
-          <p:cNvSpPr/>
-          <p:nvPr/>
-        </p:nvSpPr>
-        <p:spPr>
-          <a:xfrm flipH="1">
-            <a:off x="-720" y="4570920"/>
-            <a:ext cx="9143640" cy="572400"/>
-          </a:xfrm>
-          <a:prstGeom prst="rtTriangle">
-            <a:avLst/>
-          </a:prstGeom>
-          <a:gradFill rotWithShape="0">
-            <a:gsLst>
-              <a:gs pos="0">
-                <a:srgbClr val="DFE9FB"/>
-              </a:gs>
-              <a:gs pos="100000">
-                <a:srgbClr val="6E9BE7"/>
-              </a:gs>
-            </a:gsLst>
-            <a:lin ang="5394000"/>
-          </a:gradFill>
-          <a:ln w="0">
-            <a:noFill/>
-          </a:ln>
-        </p:spPr>
-        <p:style>
-          <a:lnRef idx="0">
-            <a:srgbClr val="FFFFFF"/>
-          </a:lnRef>
-          <a:fillRef idx="0">
-            <a:srgbClr val="FFFFFF"/>
-          </a:fillRef>
-          <a:effectRef idx="0">
-            <a:srgbClr val="FFFFFF"/>
-          </a:effectRef>
-          <a:fontRef idx="minor"/>
-        </p:style>
-        <p:txBody>
-          <a:bodyPr tIns="91440" bIns="91440" anchor="ctr">
-            <a:noAutofit/>
-          </a:bodyPr>
-          <a:p>
-            <a:pPr>
-              <a:lnSpc>
-                <a:spcPct val="100000"/>
-              </a:lnSpc>
-              <a:tabLst>
-                <a:tab pos="0" algn="l"/>
-              </a:tabLst>
-            </a:pPr>
-            <a:endParaRPr lang="pt-BR" sz="1400" b="0" strike="noStrike" spc="-1">
-              <a:solidFill>
-                <a:srgbClr val="000000"/>
-              </a:solidFill>
-              <a:latin typeface="Arial" panose="020B0604020202020204"/>
-              <a:ea typeface="Arial" panose="020B0604020202020204"/>
-            </a:endParaRPr>
-          </a:p>
-        </p:txBody>
-      </p:sp>
-      <p:sp>
-        <p:nvSpPr>
-          <p:cNvPr id="113" name="Google Shape;98;p17"/>
-          <p:cNvSpPr/>
-          <p:nvPr/>
-        </p:nvSpPr>
-        <p:spPr>
-          <a:xfrm>
-            <a:off x="0" y="4570920"/>
-            <a:ext cx="9143640" cy="572400"/>
-          </a:xfrm>
-          <a:prstGeom prst="rtTriangle">
-            <a:avLst/>
-          </a:prstGeom>
-          <a:gradFill rotWithShape="0">
-            <a:gsLst>
-              <a:gs pos="0">
-                <a:srgbClr val="00315D"/>
-              </a:gs>
-              <a:gs pos="100000">
-                <a:srgbClr val="1155CC"/>
-              </a:gs>
-            </a:gsLst>
-            <a:lin ang="2700000"/>
-          </a:gradFill>
-          <a:ln w="0">
-            <a:noFill/>
-          </a:ln>
-        </p:spPr>
-        <p:style>
-          <a:lnRef idx="0">
-            <a:srgbClr val="FFFFFF"/>
-          </a:lnRef>
-          <a:fillRef idx="0">
-            <a:srgbClr val="FFFFFF"/>
-          </a:fillRef>
-          <a:effectRef idx="0">
-            <a:srgbClr val="FFFFFF"/>
-          </a:effectRef>
-          <a:fontRef idx="minor"/>
-        </p:style>
-        <p:txBody>
-          <a:bodyPr tIns="91440" bIns="91440" anchor="ctr">
-            <a:noAutofit/>
-          </a:bodyPr>
-          <a:p>
-            <a:pPr>
-              <a:lnSpc>
-                <a:spcPct val="100000"/>
-              </a:lnSpc>
-              <a:tabLst>
-                <a:tab pos="0" algn="l"/>
-              </a:tabLst>
-            </a:pPr>
-            <a:endParaRPr lang="pt-BR" sz="1400" b="0" strike="noStrike" spc="-1">
-              <a:solidFill>
-                <a:srgbClr val="000000"/>
-              </a:solidFill>
-              <a:latin typeface="Arial" panose="020B0604020202020204"/>
-              <a:ea typeface="Arial" panose="020B0604020202020204"/>
-            </a:endParaRPr>
-          </a:p>
-        </p:txBody>
-      </p:sp>
-      <p:pic>
-        <p:nvPicPr>
-          <p:cNvPr id="114" name="Google Shape;99;p17"/>
-          <p:cNvPicPr/>
-          <p:nvPr/>
-        </p:nvPicPr>
-        <p:blipFill>
-          <a:blip r:embed="rId2"/>
-          <a:stretch>
-            <a:fillRect/>
-          </a:stretch>
-        </p:blipFill>
-        <p:spPr>
-          <a:xfrm>
-            <a:off x="117000" y="4700520"/>
-            <a:ext cx="1223280" cy="466920"/>
-          </a:xfrm>
-          <a:prstGeom prst="rect">
-            <a:avLst/>
-          </a:prstGeom>
-          <a:ln w="0">
-            <a:noFill/>
-          </a:ln>
-          <a:effectLst>
-            <a:outerShdw blurRad="57240" dist="19080" dir="5400000" algn="bl" rotWithShape="0">
-              <a:srgbClr val="000000">
-                <a:alpha val="50000"/>
-              </a:srgbClr>
-            </a:outerShdw>
-          </a:effectLst>
-        </p:spPr>
-      </p:pic>
-    </p:spTree>
-  </p:cSld>
-  <p:clrMapOvr>
-    <a:masterClrMapping/>
-  </p:clrMapOvr>
-</p:sld>
-</file>
-
-<file path=ppt/slides/slide16.xml><?xml version="1.0" encoding="utf-8"?>
-<p:sld xmlns:a="http://schemas.openxmlformats.org/drawingml/2006/main" xmlns:r="http://schemas.openxmlformats.org/officeDocument/2006/relationships" xmlns:p="http://schemas.openxmlformats.org/presentationml/2006/main">
-  <p:cSld>
-    <p:spTree>
-      <p:nvGrpSpPr>
-        <p:cNvPr id="1" name=""/>
-        <p:cNvGrpSpPr/>
-        <p:nvPr/>
-      </p:nvGrpSpPr>
-      <p:grpSpPr>
-        <a:xfrm>
-          <a:off x="0" y="0"/>
-          <a:ext cx="0" cy="0"/>
-          <a:chOff x="0" y="0"/>
-          <a:chExt cx="0" cy="0"/>
-        </a:xfrm>
-      </p:grpSpPr>
-      <p:sp>
-        <p:nvSpPr>
-          <p:cNvPr id="109" name="PlaceHolder 1"/>
-          <p:cNvSpPr>
-            <a:spLocks noGrp="1"/>
-          </p:cNvSpPr>
-          <p:nvPr>
-            <p:ph type="title"/>
-          </p:nvPr>
-        </p:nvSpPr>
-        <p:spPr>
-          <a:xfrm>
-            <a:off x="311760" y="82080"/>
-            <a:ext cx="8520120" cy="572400"/>
-          </a:xfrm>
-          <a:prstGeom prst="rect">
-            <a:avLst/>
-          </a:prstGeom>
-          <a:noFill/>
-          <a:ln w="0">
-            <a:noFill/>
-          </a:ln>
-        </p:spPr>
-        <p:txBody>
-          <a:bodyPr tIns="91440" bIns="91440" anchor="t">
-            <a:normAutofit fontScale="89000"/>
-          </a:bodyPr>
-          <a:p>
-            <a:pPr indent="0">
-              <a:lnSpc>
-                <a:spcPct val="115000"/>
-              </a:lnSpc>
-              <a:spcBef>
-                <a:spcPts val="1200"/>
-              </a:spcBef>
-              <a:spcAft>
-                <a:spcPts val="1200"/>
-              </a:spcAft>
-              <a:buNone/>
-              <a:tabLst>
-                <a:tab pos="0" algn="l"/>
-              </a:tabLst>
-            </a:pPr>
-            <a:r>
-              <a:rPr lang="pt-BR" sz="2500" b="1" i="1" strike="noStrike" spc="-1">
-                <a:solidFill>
-                  <a:srgbClr val="00315D"/>
-                </a:solidFill>
-                <a:latin typeface="Arial" panose="020B0604020202020204"/>
-                <a:ea typeface="Arial" panose="020B0604020202020204"/>
-              </a:rPr>
-              <a:t>Boas Práticas - Modelos </a:t>
-            </a:r>
-            <a:endParaRPr lang="pt-BR" sz="2500" b="0" strike="noStrike" spc="-1">
-              <a:solidFill>
-                <a:srgbClr val="000000"/>
-              </a:solidFill>
-              <a:latin typeface="Arial" panose="020B0604020202020204"/>
-            </a:endParaRPr>
-          </a:p>
-        </p:txBody>
-      </p:sp>
-      <p:sp>
-        <p:nvSpPr>
-          <p:cNvPr id="110" name="PlaceHolder 2"/>
-          <p:cNvSpPr>
-            <a:spLocks noGrp="1"/>
-          </p:cNvSpPr>
-          <p:nvPr>
-            <p:ph/>
-          </p:nvPr>
-        </p:nvSpPr>
-        <p:spPr>
-          <a:xfrm>
-            <a:off x="541020" y="729615"/>
-            <a:ext cx="4973955" cy="4196080"/>
-          </a:xfrm>
-          <a:prstGeom prst="rect">
-            <a:avLst/>
-          </a:prstGeom>
-          <a:noFill/>
-          <a:ln w="0">
-            <a:noFill/>
-          </a:ln>
-        </p:spPr>
-        <p:txBody>
-          <a:bodyPr tIns="91440" bIns="91440" anchor="t">
-            <a:noAutofit/>
-          </a:bodyPr>
-          <a:p>
-            <a:pPr marL="457200" indent="-406400" algn="just">
-              <a:lnSpc>
-                <a:spcPct val="115000"/>
-              </a:lnSpc>
-              <a:buClr>
-                <a:srgbClr val="00315D"/>
-              </a:buClr>
-              <a:buFont typeface="Arial" panose="020B0604020202020204"/>
-              <a:buChar char="●"/>
-            </a:pPr>
-            <a:r>
-              <a:rPr lang="pt-BR" sz="1600" b="0" strike="noStrike">
-                <a:solidFill>
-                  <a:srgbClr val="3B3B3B"/>
-                </a:solidFill>
-                <a:latin typeface="Arial" panose="020B0604020202020204"/>
-                <a:ea typeface="Arial" panose="020B0604020202020204"/>
-                <a:sym typeface="+mn-ea"/>
-              </a:rPr>
-              <a:t>Antes de iniciar um novo relatório verifique se é possível utilizar um modelo existente, para manter um padrão. Podendo ainda marcar ou não a opção “Herança do relatório”.</a:t>
-            </a:r>
-            <a:endParaRPr lang="pt-BR" sz="1600" b="0" strike="noStrike">
-              <a:solidFill>
-                <a:srgbClr val="3B3B3B"/>
-              </a:solidFill>
-              <a:latin typeface="Arial" panose="020B0604020202020204"/>
-              <a:ea typeface="Arial" panose="020B0604020202020204"/>
-              <a:sym typeface="+mn-ea"/>
-            </a:endParaRPr>
-          </a:p>
-          <a:p>
-            <a:pPr marL="457200" indent="-406400" algn="just">
-              <a:lnSpc>
-                <a:spcPct val="115000"/>
-              </a:lnSpc>
-              <a:buClr>
-                <a:srgbClr val="00315D"/>
-              </a:buClr>
-              <a:buFont typeface="Arial" panose="020B0604020202020204"/>
-              <a:buChar char="●"/>
-            </a:pPr>
-            <a:endParaRPr lang="pt-BR" sz="2000" b="0" strike="noStrike">
-              <a:solidFill>
-                <a:srgbClr val="3B3B3B"/>
-              </a:solidFill>
-              <a:latin typeface="Arial" panose="020B0604020202020204"/>
-              <a:ea typeface="Arial" panose="020B0604020202020204"/>
-              <a:sym typeface="+mn-ea"/>
-            </a:endParaRPr>
-          </a:p>
-          <a:p>
-            <a:pPr marL="457200" indent="-406400" algn="just">
-              <a:lnSpc>
-                <a:spcPct val="115000"/>
-              </a:lnSpc>
-              <a:buClr>
-                <a:srgbClr val="00315D"/>
-              </a:buClr>
-              <a:buFont typeface="Arial" panose="020B0604020202020204"/>
-              <a:buChar char="●"/>
-            </a:pPr>
-            <a:endParaRPr lang="pt-BR" sz="2000" b="0" strike="noStrike">
-              <a:solidFill>
-                <a:srgbClr val="3B3B3B"/>
-              </a:solidFill>
-              <a:latin typeface="Arial" panose="020B0604020202020204"/>
-              <a:ea typeface="Arial" panose="020B0604020202020204"/>
-              <a:sym typeface="+mn-ea"/>
-            </a:endParaRPr>
-          </a:p>
-          <a:p>
-            <a:pPr marL="914400" lvl="1" indent="-406400" algn="just">
-              <a:lnSpc>
-                <a:spcPct val="115000"/>
-              </a:lnSpc>
-              <a:buClr>
-                <a:srgbClr val="00315D"/>
-              </a:buClr>
-              <a:buFont typeface="Wingdings" panose="05000000000000000000" charset="0"/>
-              <a:buChar char="Ø"/>
-            </a:pPr>
-            <a:r>
-              <a:rPr kumimoji="0" lang="pt-BR" sz="1400" b="1" i="0" u="none" strike="noStrike" kern="0" cap="none" spc="-1" normalizeH="0" baseline="0" noProof="1">
-                <a:solidFill>
-                  <a:srgbClr val="00315D"/>
-                </a:solidFill>
-                <a:latin typeface="Arial" panose="020B0604020202020204"/>
-                <a:ea typeface="Arial" panose="020B0604020202020204"/>
-                <a:cs typeface="+mn-ea"/>
-                <a:sym typeface="+mn-ea"/>
-              </a:rPr>
-              <a:t>Modelo</a:t>
-            </a:r>
-            <a:r>
-              <a:rPr lang="pt-BR" sz="1400" b="1" strike="noStrike" spc="-1">
-                <a:solidFill>
-                  <a:srgbClr val="00315D"/>
-                </a:solidFill>
-                <a:latin typeface="Arial" panose="020B0604020202020204"/>
-                <a:ea typeface="Arial" panose="020B0604020202020204"/>
-                <a:sym typeface="+mn-ea"/>
-              </a:rPr>
-              <a:t>: É um relatório padrão, que pode vir com um cabeçalho e rodapé prontos, por exemplo. Também é possível criar novos modelos.</a:t>
-            </a:r>
-            <a:endParaRPr lang="pt-BR" sz="1400" b="1" strike="noStrike" spc="-1">
-              <a:solidFill>
-                <a:srgbClr val="00315D"/>
-              </a:solidFill>
-              <a:latin typeface="Arial" panose="020B0604020202020204"/>
-              <a:ea typeface="Arial" panose="020B0604020202020204"/>
-              <a:sym typeface="+mn-ea"/>
-            </a:endParaRPr>
-          </a:p>
-          <a:p>
-            <a:pPr marL="457200" indent="-406400">
-              <a:lnSpc>
-                <a:spcPct val="115000"/>
-              </a:lnSpc>
-              <a:buClr>
-                <a:srgbClr val="00315D"/>
-              </a:buClr>
-              <a:buFont typeface="Wingdings" panose="05000000000000000000" charset="0"/>
-              <a:buChar char="Ø"/>
-            </a:pPr>
-            <a:endParaRPr lang="pt-BR" sz="1400" b="1" strike="noStrike" spc="-1">
-              <a:solidFill>
-                <a:srgbClr val="00315D"/>
-              </a:solidFill>
-              <a:latin typeface="Arial" panose="020B0604020202020204"/>
-              <a:ea typeface="Arial" panose="020B0604020202020204"/>
-              <a:sym typeface="+mn-ea"/>
-            </a:endParaRPr>
-          </a:p>
-          <a:p>
-            <a:pPr marL="50800" indent="0">
-              <a:lnSpc>
-                <a:spcPct val="115000"/>
-              </a:lnSpc>
-              <a:buClr>
-                <a:srgbClr val="00315D"/>
-              </a:buClr>
-              <a:buFont typeface="Wingdings" panose="05000000000000000000" charset="0"/>
-              <a:buNone/>
-            </a:pPr>
-            <a:endParaRPr lang="pt-BR" sz="1400" b="1" strike="noStrike" spc="-1">
-              <a:solidFill>
-                <a:srgbClr val="00315D"/>
-              </a:solidFill>
-              <a:latin typeface="Arial" panose="020B0604020202020204"/>
-              <a:ea typeface="Arial" panose="020B0604020202020204"/>
-              <a:sym typeface="+mn-ea"/>
-            </a:endParaRPr>
-          </a:p>
-        </p:txBody>
-      </p:sp>
-      <p:grpSp>
-        <p:nvGrpSpPr>
-          <p:cNvPr id="111" name="Google Shape;96;p17"/>
-          <p:cNvGrpSpPr/>
-          <p:nvPr/>
-        </p:nvGrpSpPr>
-        <p:grpSpPr>
-          <a:xfrm>
-            <a:off x="-360" y="4570920"/>
-            <a:ext cx="9144000" cy="596520"/>
-            <a:chOff x="-360" y="4570920"/>
-            <a:chExt cx="9144000" cy="596520"/>
-          </a:xfrm>
-        </p:grpSpPr>
-        <p:sp>
-          <p:nvSpPr>
-            <p:cNvPr id="112" name="Google Shape;97;p17"/>
-            <p:cNvSpPr/>
-            <p:nvPr/>
-          </p:nvSpPr>
-          <p:spPr>
-            <a:xfrm flipH="1">
-              <a:off x="-720" y="4570920"/>
-              <a:ext cx="9143640" cy="572400"/>
-            </a:xfrm>
-            <a:prstGeom prst="rtTriangle">
-              <a:avLst/>
-            </a:prstGeom>
-            <a:gradFill rotWithShape="0">
-              <a:gsLst>
-                <a:gs pos="0">
-                  <a:srgbClr val="DFE9FB"/>
-                </a:gs>
-                <a:gs pos="100000">
-                  <a:srgbClr val="6E9BE7"/>
-                </a:gs>
-              </a:gsLst>
-              <a:lin ang="5394000"/>
-            </a:gradFill>
-            <a:ln w="0">
-              <a:noFill/>
-            </a:ln>
-          </p:spPr>
-          <p:style>
-            <a:lnRef idx="0">
-              <a:srgbClr val="FFFFFF"/>
-            </a:lnRef>
-            <a:fillRef idx="0">
-              <a:srgbClr val="FFFFFF"/>
-            </a:fillRef>
-            <a:effectRef idx="0">
-              <a:srgbClr val="FFFFFF"/>
-            </a:effectRef>
-            <a:fontRef idx="minor"/>
-          </p:style>
-          <p:txBody>
-            <a:bodyPr tIns="91440" bIns="91440" anchor="ctr">
-              <a:noAutofit/>
-            </a:bodyPr>
-            <a:p>
-              <a:pPr>
-                <a:lnSpc>
-                  <a:spcPct val="100000"/>
-                </a:lnSpc>
-                <a:tabLst>
-                  <a:tab pos="0" algn="l"/>
-                </a:tabLst>
-              </a:pPr>
-              <a:endParaRPr lang="pt-BR" sz="1400" b="0" strike="noStrike" spc="-1">
-                <a:solidFill>
-                  <a:srgbClr val="000000"/>
-                </a:solidFill>
-                <a:latin typeface="Arial" panose="020B0604020202020204"/>
-                <a:ea typeface="Arial" panose="020B0604020202020204"/>
-              </a:endParaRPr>
-            </a:p>
-          </p:txBody>
-        </p:sp>
-        <p:sp>
-          <p:nvSpPr>
-            <p:cNvPr id="113" name="Google Shape;98;p17"/>
-            <p:cNvSpPr/>
-            <p:nvPr/>
-          </p:nvSpPr>
-          <p:spPr>
-            <a:xfrm>
-              <a:off x="0" y="4570920"/>
-              <a:ext cx="9143640" cy="572400"/>
-            </a:xfrm>
-            <a:prstGeom prst="rtTriangle">
-              <a:avLst/>
-            </a:prstGeom>
-            <a:gradFill rotWithShape="0">
-              <a:gsLst>
-                <a:gs pos="0">
-                  <a:srgbClr val="00315D"/>
-                </a:gs>
-                <a:gs pos="100000">
-                  <a:srgbClr val="1155CC"/>
-                </a:gs>
-              </a:gsLst>
-              <a:lin ang="2700000"/>
-            </a:gradFill>
-            <a:ln w="0">
-              <a:noFill/>
-            </a:ln>
-          </p:spPr>
-          <p:style>
-            <a:lnRef idx="0">
-              <a:srgbClr val="FFFFFF"/>
-            </a:lnRef>
-            <a:fillRef idx="0">
-              <a:srgbClr val="FFFFFF"/>
-            </a:fillRef>
-            <a:effectRef idx="0">
-              <a:srgbClr val="FFFFFF"/>
-            </a:effectRef>
-            <a:fontRef idx="minor"/>
-          </p:style>
-          <p:txBody>
-            <a:bodyPr tIns="91440" bIns="91440" anchor="ctr">
-              <a:noAutofit/>
-            </a:bodyPr>
-            <a:p>
-              <a:pPr>
-                <a:lnSpc>
-                  <a:spcPct val="100000"/>
-                </a:lnSpc>
-                <a:tabLst>
-                  <a:tab pos="0" algn="l"/>
-                </a:tabLst>
-              </a:pPr>
-              <a:endParaRPr lang="pt-BR" sz="1400" b="0" strike="noStrike" spc="-1">
-                <a:solidFill>
-                  <a:srgbClr val="000000"/>
-                </a:solidFill>
-                <a:latin typeface="Arial" panose="020B0604020202020204"/>
-                <a:ea typeface="Arial" panose="020B0604020202020204"/>
-              </a:endParaRPr>
-            </a:p>
-          </p:txBody>
-        </p:sp>
-        <p:pic>
-          <p:nvPicPr>
-            <p:cNvPr id="114" name="Google Shape;99;p17"/>
-            <p:cNvPicPr/>
-            <p:nvPr/>
-          </p:nvPicPr>
-          <p:blipFill>
-            <a:blip r:embed="rId1"/>
-            <a:stretch>
-              <a:fillRect/>
-            </a:stretch>
-          </p:blipFill>
-          <p:spPr>
-            <a:xfrm>
-              <a:off x="117000" y="4700520"/>
-              <a:ext cx="1223280" cy="466920"/>
-            </a:xfrm>
-            <a:prstGeom prst="rect">
-              <a:avLst/>
-            </a:prstGeom>
-            <a:ln w="0">
-              <a:noFill/>
-            </a:ln>
-            <a:effectLst>
-              <a:outerShdw blurRad="57240" dist="19080" dir="5400000" algn="bl" rotWithShape="0">
-                <a:srgbClr val="000000">
-                  <a:alpha val="50000"/>
-                </a:srgbClr>
-              </a:outerShdw>
-            </a:effectLst>
-          </p:spPr>
-        </p:pic>
-      </p:grpSp>
-      <p:pic>
-        <p:nvPicPr>
-          <p:cNvPr id="2" name="Imagem 1"/>
-          <p:cNvPicPr>
-            <a:picLocks noChangeAspect="1"/>
-          </p:cNvPicPr>
-          <p:nvPr/>
-        </p:nvPicPr>
-        <p:blipFill>
-          <a:blip r:embed="rId2"/>
-          <a:stretch>
-            <a:fillRect/>
-          </a:stretch>
-        </p:blipFill>
-        <p:spPr>
-          <a:xfrm>
-            <a:off x="5868035" y="1202055"/>
-            <a:ext cx="3046730" cy="3250565"/>
-          </a:xfrm>
-          <a:prstGeom prst="rect">
-            <a:avLst/>
-          </a:prstGeom>
-        </p:spPr>
-      </p:pic>
-      <p:sp>
-        <p:nvSpPr>
-          <p:cNvPr id="3" name="Caixa de Texto 2"/>
-          <p:cNvSpPr txBox="1"/>
-          <p:nvPr/>
-        </p:nvSpPr>
-        <p:spPr>
-          <a:xfrm>
-            <a:off x="5828665" y="821055"/>
-            <a:ext cx="3035300" cy="306705"/>
-          </a:xfrm>
-          <a:prstGeom prst="rect">
-            <a:avLst/>
-          </a:prstGeom>
-          <a:noFill/>
-        </p:spPr>
-        <p:txBody>
-          <a:bodyPr wrap="square" rtlCol="0">
-            <a:spAutoFit/>
-          </a:bodyPr>
-          <a:p>
-            <a:r>
-              <a:rPr lang="pt-BR" sz="1400" b="1" kern="0" spc="-1">
-                <a:solidFill>
-                  <a:srgbClr val="00315D"/>
-                </a:solidFill>
-                <a:latin typeface="Arial" panose="020B0604020202020204"/>
-                <a:ea typeface="Arial" panose="020B0604020202020204"/>
-                <a:cs typeface="+mn-ea"/>
-              </a:rPr>
-              <a:t>Menu Arquivo &gt; Novo</a:t>
-            </a:r>
-            <a:endParaRPr lang="pt-BR" altLang="en-US" sz="1400" b="1"/>
-          </a:p>
-        </p:txBody>
-      </p:sp>
-    </p:spTree>
-  </p:cSld>
-  <p:clrMapOvr>
-    <a:masterClrMapping/>
-  </p:clrMapOvr>
-  <p:transition spd="slow">
-    <p:fade/>
-  </p:transition>
-  <p:timing>
-    <p:tnLst>
-      <p:par>
-        <p:cTn id="1" dur="indefinite" restart="never" nodeType="tmRoot">
-          <p:childTnLst>
-            <p:seq concurrent="1" nextAc="seek">
-              <p:cTn id="2" dur="indefinite" nodeType="mainSeq">
-                <p:childTnLst>
-                  <p:par>
-                    <p:cTn id="3" fill="hold">
-                      <p:stCondLst>
-                        <p:cond delay="indefinite"/>
-                        <p:cond evt="onBegin" delay="0">
-                          <p:tn val="2"/>
-                        </p:cond>
-                      </p:stCondLst>
-                      <p:childTnLst>
-                        <p:par>
-                          <p:cTn id="4" fill="hold">
-                            <p:stCondLst>
-                              <p:cond delay="0"/>
-                            </p:stCondLst>
-                            <p:childTnLst>
-                              <p:par>
-                                <p:cTn id="5" presetID="1" presetClass="entr" presetSubtype="0" fill="hold" nodeType="afterEffect">
-                                  <p:stCondLst>
-                                    <p:cond delay="0"/>
-                                  </p:stCondLst>
-                                  <p:childTnLst>
-                                    <p:set>
-                                      <p:cBhvr>
-                                        <p:cTn id="6" dur="1" fill="hold">
-                                          <p:stCondLst>
-                                            <p:cond delay="0"/>
-                                          </p:stCondLst>
-                                        </p:cTn>
-                                        <p:tgtEl>
-                                          <p:spTgt spid="110">
-                                            <p:txEl>
-                                              <p:pRg st="0" end="0"/>
-                                            </p:txEl>
-                                          </p:spTgt>
-                                        </p:tgtEl>
-                                        <p:attrNameLst>
-                                          <p:attrName>style.visibility</p:attrName>
-                                        </p:attrNameLst>
-                                      </p:cBhvr>
-                                      <p:to>
-                                        <p:strVal val="visible"/>
-                                      </p:to>
-                                    </p:set>
-                                  </p:childTnLst>
-                                </p:cTn>
-                              </p:par>
-                            </p:childTnLst>
-                          </p:cTn>
-                        </p:par>
-                        <p:par>
-                          <p:cTn id="7" fill="hold">
-                            <p:stCondLst>
-                              <p:cond delay="0"/>
-                            </p:stCondLst>
-                            <p:childTnLst>
-                              <p:par>
-                                <p:cTn id="8" presetID="1" presetClass="entr" presetSubtype="0" fill="hold" nodeType="afterEffect">
-                                  <p:stCondLst>
-                                    <p:cond delay="0"/>
-                                  </p:stCondLst>
-                                  <p:childTnLst>
-                                    <p:set>
-                                      <p:cBhvr>
-                                        <p:cTn id="9" dur="1" fill="hold">
-                                          <p:stCondLst>
-                                            <p:cond delay="0"/>
-                                          </p:stCondLst>
-                                        </p:cTn>
-                                        <p:tgtEl>
-                                          <p:spTgt spid="110">
-                                            <p:txEl>
-                                              <p:pRg st="3" end="3"/>
-                                            </p:txEl>
-                                          </p:spTgt>
-                                        </p:tgtEl>
-                                        <p:attrNameLst>
-                                          <p:attrName>style.visibility</p:attrName>
-                                        </p:attrNameLst>
-                                      </p:cBhvr>
-                                      <p:to>
-                                        <p:strVal val="visible"/>
-                                      </p:to>
-                                    </p:set>
-                                  </p:childTnLst>
-                                </p:cTn>
-                              </p:par>
-                            </p:childTnLst>
-                          </p:cTn>
-                        </p:par>
-                      </p:childTnLst>
-                    </p:cTn>
-                  </p:par>
-                </p:childTnLst>
-              </p:cTn>
-              <p:prevCondLst>
-                <p:cond evt="onPrev">
-                  <p:tgtEl>
-                    <p:sldTgt/>
-                  </p:tgtEl>
-                </p:cond>
-              </p:prevCondLst>
-              <p:nextCondLst>
-                <p:cond evt="onNext">
-                  <p:tgtEl>
-                    <p:sldTgt/>
-                  </p:tgtEl>
-                </p:cond>
-              </p:nextCondLst>
-            </p:seq>
-          </p:childTnLst>
-        </p:cTn>
-      </p:par>
-    </p:tnLst>
-  </p:timing>
-</p:sld>
-</file>
-
-<file path=ppt/slides/slide17.xml><?xml version="1.0" encoding="utf-8"?>
-<p:sld xmlns:a="http://schemas.openxmlformats.org/drawingml/2006/main" xmlns:r="http://schemas.openxmlformats.org/officeDocument/2006/relationships" xmlns:p="http://schemas.openxmlformats.org/presentationml/2006/main">
-  <p:cSld>
-    <p:spTree>
-      <p:nvGrpSpPr>
-        <p:cNvPr id="1" name=""/>
-        <p:cNvGrpSpPr/>
-        <p:nvPr/>
-      </p:nvGrpSpPr>
-      <p:grpSpPr>
-        <a:xfrm>
-          <a:off x="0" y="0"/>
-          <a:ext cx="0" cy="0"/>
-          <a:chOff x="0" y="0"/>
-          <a:chExt cx="0" cy="0"/>
-        </a:xfrm>
-      </p:grpSpPr>
-      <p:sp>
-        <p:nvSpPr>
-          <p:cNvPr id="109" name="PlaceHolder 1"/>
-          <p:cNvSpPr>
-            <a:spLocks noGrp="1"/>
-          </p:cNvSpPr>
-          <p:nvPr>
-            <p:ph type="title"/>
-          </p:nvPr>
-        </p:nvSpPr>
-        <p:spPr>
-          <a:xfrm>
-            <a:off x="311760" y="82080"/>
-            <a:ext cx="8520120" cy="572400"/>
-          </a:xfrm>
-          <a:prstGeom prst="rect">
-            <a:avLst/>
-          </a:prstGeom>
-          <a:noFill/>
-          <a:ln w="0">
-            <a:noFill/>
-          </a:ln>
-        </p:spPr>
-        <p:txBody>
-          <a:bodyPr tIns="91440" bIns="91440" anchor="t">
-            <a:normAutofit fontScale="89000"/>
-          </a:bodyPr>
-          <a:p>
-            <a:pPr indent="0">
-              <a:lnSpc>
-                <a:spcPct val="115000"/>
-              </a:lnSpc>
-              <a:spcBef>
-                <a:spcPts val="1200"/>
-              </a:spcBef>
-              <a:spcAft>
-                <a:spcPts val="1200"/>
-              </a:spcAft>
-              <a:buNone/>
-              <a:tabLst>
-                <a:tab pos="0" algn="l"/>
-              </a:tabLst>
-            </a:pPr>
-            <a:r>
-              <a:rPr lang="pt-BR" sz="2500" b="1" i="1" strike="noStrike" spc="-1">
-                <a:solidFill>
-                  <a:srgbClr val="00315D"/>
-                </a:solidFill>
-                <a:latin typeface="Arial" panose="020B0604020202020204"/>
-                <a:ea typeface="Arial" panose="020B0604020202020204"/>
-              </a:rPr>
-              <a:t>Boas Práticas - Modelos </a:t>
-            </a:r>
-            <a:endParaRPr lang="pt-BR" sz="2500" b="0" strike="noStrike" spc="-1">
-              <a:solidFill>
-                <a:srgbClr val="000000"/>
-              </a:solidFill>
-              <a:latin typeface="Arial" panose="020B0604020202020204"/>
-            </a:endParaRPr>
-          </a:p>
-        </p:txBody>
-      </p:sp>
-      <p:sp>
-        <p:nvSpPr>
-          <p:cNvPr id="110" name="PlaceHolder 2"/>
-          <p:cNvSpPr>
-            <a:spLocks noGrp="1"/>
-          </p:cNvSpPr>
-          <p:nvPr>
-            <p:ph/>
-          </p:nvPr>
-        </p:nvSpPr>
-        <p:spPr>
-          <a:xfrm>
-            <a:off x="541020" y="729615"/>
-            <a:ext cx="4973955" cy="4196080"/>
-          </a:xfrm>
-          <a:prstGeom prst="rect">
-            <a:avLst/>
-          </a:prstGeom>
-          <a:noFill/>
-          <a:ln w="0">
-            <a:noFill/>
-          </a:ln>
-        </p:spPr>
-        <p:txBody>
-          <a:bodyPr tIns="91440" bIns="91440" anchor="t">
-            <a:noAutofit/>
-          </a:bodyPr>
-          <a:p>
-            <a:pPr marL="457200" indent="-406400" algn="just">
-              <a:lnSpc>
-                <a:spcPct val="115000"/>
-              </a:lnSpc>
-              <a:buClr>
-                <a:srgbClr val="00315D"/>
-              </a:buClr>
-              <a:buFont typeface="Arial" panose="020B0604020202020204"/>
-              <a:buChar char="●"/>
-            </a:pPr>
-            <a:r>
-              <a:rPr lang="pt-BR" sz="1600" b="0" strike="noStrike">
-                <a:solidFill>
-                  <a:srgbClr val="3B3B3B"/>
-                </a:solidFill>
-                <a:latin typeface="Arial" panose="020B0604020202020204"/>
-                <a:ea typeface="Arial" panose="020B0604020202020204"/>
-                <a:sym typeface="+mn-ea"/>
-              </a:rPr>
-              <a:t>Quando a opção “Herança do relatório” for marcada, surgirá um cadeado nos campos/códigos (figura 1). Significa que será possível alterar esses campos/códigos apenas no modelo pai. Se esta opção estiver desmarcada, ele trará apenas uma cópia do modelo, permitindo a edição de qualquer campo/código (figura 2), não havendo vínculo de herança, ou seja, ao editar o modelo pai não será feita a alteração nesse relatório. </a:t>
-            </a:r>
-            <a:endParaRPr lang="pt-BR" sz="1000" b="1" strike="noStrike" spc="-1">
-              <a:solidFill>
-                <a:srgbClr val="00315D"/>
-              </a:solidFill>
-              <a:latin typeface="Arial" panose="020B0604020202020204"/>
-              <a:ea typeface="Arial" panose="020B0604020202020204"/>
-              <a:sym typeface="+mn-ea"/>
-            </a:endParaRPr>
-          </a:p>
-          <a:p>
-            <a:pPr marL="50800" indent="0">
-              <a:lnSpc>
-                <a:spcPct val="115000"/>
-              </a:lnSpc>
-              <a:buClr>
-                <a:srgbClr val="00315D"/>
-              </a:buClr>
-              <a:buFont typeface="Wingdings" panose="05000000000000000000" charset="0"/>
-              <a:buNone/>
-            </a:pPr>
-            <a:endParaRPr lang="pt-BR" sz="1000" b="1" strike="noStrike" spc="-1">
-              <a:solidFill>
-                <a:srgbClr val="00315D"/>
-              </a:solidFill>
-              <a:latin typeface="Arial" panose="020B0604020202020204"/>
-              <a:ea typeface="Arial" panose="020B0604020202020204"/>
-              <a:sym typeface="+mn-ea"/>
-            </a:endParaRPr>
-          </a:p>
-        </p:txBody>
-      </p:sp>
-      <p:grpSp>
-        <p:nvGrpSpPr>
-          <p:cNvPr id="111" name="Google Shape;96;p17"/>
-          <p:cNvGrpSpPr/>
-          <p:nvPr/>
-        </p:nvGrpSpPr>
-        <p:grpSpPr>
-          <a:xfrm>
-            <a:off x="-360" y="4570920"/>
-            <a:ext cx="9144000" cy="596520"/>
-            <a:chOff x="-360" y="4570920"/>
-            <a:chExt cx="9144000" cy="596520"/>
-          </a:xfrm>
-        </p:grpSpPr>
-        <p:sp>
-          <p:nvSpPr>
-            <p:cNvPr id="112" name="Google Shape;97;p17"/>
-            <p:cNvSpPr/>
-            <p:nvPr/>
-          </p:nvSpPr>
-          <p:spPr>
-            <a:xfrm flipH="1">
-              <a:off x="-720" y="4570920"/>
-              <a:ext cx="9143640" cy="572400"/>
-            </a:xfrm>
-            <a:prstGeom prst="rtTriangle">
-              <a:avLst/>
-            </a:prstGeom>
-            <a:gradFill rotWithShape="0">
-              <a:gsLst>
-                <a:gs pos="0">
-                  <a:srgbClr val="DFE9FB"/>
-                </a:gs>
-                <a:gs pos="100000">
-                  <a:srgbClr val="6E9BE7"/>
-                </a:gs>
-              </a:gsLst>
-              <a:lin ang="5394000"/>
-            </a:gradFill>
-            <a:ln w="0">
-              <a:noFill/>
-            </a:ln>
-          </p:spPr>
-          <p:style>
-            <a:lnRef idx="0">
-              <a:srgbClr val="FFFFFF"/>
-            </a:lnRef>
-            <a:fillRef idx="0">
-              <a:srgbClr val="FFFFFF"/>
-            </a:fillRef>
-            <a:effectRef idx="0">
-              <a:srgbClr val="FFFFFF"/>
-            </a:effectRef>
-            <a:fontRef idx="minor"/>
-          </p:style>
-          <p:txBody>
-            <a:bodyPr tIns="91440" bIns="91440" anchor="ctr">
-              <a:noAutofit/>
-            </a:bodyPr>
-            <a:p>
-              <a:pPr>
-                <a:lnSpc>
-                  <a:spcPct val="100000"/>
-                </a:lnSpc>
-                <a:tabLst>
-                  <a:tab pos="0" algn="l"/>
-                </a:tabLst>
-              </a:pPr>
-              <a:endParaRPr lang="pt-BR" sz="1400" b="0" strike="noStrike" spc="-1">
-                <a:solidFill>
-                  <a:srgbClr val="000000"/>
-                </a:solidFill>
-                <a:latin typeface="Arial" panose="020B0604020202020204"/>
-                <a:ea typeface="Arial" panose="020B0604020202020204"/>
-              </a:endParaRPr>
-            </a:p>
-          </p:txBody>
-        </p:sp>
-        <p:sp>
-          <p:nvSpPr>
-            <p:cNvPr id="113" name="Google Shape;98;p17"/>
-            <p:cNvSpPr/>
-            <p:nvPr/>
-          </p:nvSpPr>
-          <p:spPr>
-            <a:xfrm>
-              <a:off x="0" y="4570920"/>
-              <a:ext cx="9143640" cy="572400"/>
-            </a:xfrm>
-            <a:prstGeom prst="rtTriangle">
-              <a:avLst/>
-            </a:prstGeom>
-            <a:gradFill rotWithShape="0">
-              <a:gsLst>
-                <a:gs pos="0">
-                  <a:srgbClr val="00315D"/>
-                </a:gs>
-                <a:gs pos="100000">
-                  <a:srgbClr val="1155CC"/>
-                </a:gs>
-              </a:gsLst>
-              <a:lin ang="2700000"/>
-            </a:gradFill>
-            <a:ln w="0">
-              <a:noFill/>
-            </a:ln>
-          </p:spPr>
-          <p:style>
-            <a:lnRef idx="0">
-              <a:srgbClr val="FFFFFF"/>
-            </a:lnRef>
-            <a:fillRef idx="0">
-              <a:srgbClr val="FFFFFF"/>
-            </a:fillRef>
-            <a:effectRef idx="0">
-              <a:srgbClr val="FFFFFF"/>
-            </a:effectRef>
-            <a:fontRef idx="minor"/>
-          </p:style>
-          <p:txBody>
-            <a:bodyPr tIns="91440" bIns="91440" anchor="ctr">
-              <a:noAutofit/>
-            </a:bodyPr>
-            <a:p>
-              <a:pPr>
-                <a:lnSpc>
-                  <a:spcPct val="100000"/>
-                </a:lnSpc>
-                <a:tabLst>
-                  <a:tab pos="0" algn="l"/>
-                </a:tabLst>
-              </a:pPr>
-              <a:endParaRPr lang="pt-BR" sz="1400" b="0" strike="noStrike" spc="-1">
-                <a:solidFill>
-                  <a:srgbClr val="000000"/>
-                </a:solidFill>
-                <a:latin typeface="Arial" panose="020B0604020202020204"/>
-                <a:ea typeface="Arial" panose="020B0604020202020204"/>
-              </a:endParaRPr>
-            </a:p>
-          </p:txBody>
-        </p:sp>
-        <p:pic>
-          <p:nvPicPr>
-            <p:cNvPr id="114" name="Google Shape;99;p17"/>
-            <p:cNvPicPr/>
-            <p:nvPr/>
-          </p:nvPicPr>
-          <p:blipFill>
-            <a:blip r:embed="rId1"/>
-            <a:stretch>
-              <a:fillRect/>
-            </a:stretch>
-          </p:blipFill>
-          <p:spPr>
-            <a:xfrm>
-              <a:off x="117000" y="4700520"/>
-              <a:ext cx="1223280" cy="466920"/>
-            </a:xfrm>
-            <a:prstGeom prst="rect">
-              <a:avLst/>
-            </a:prstGeom>
-            <a:ln w="0">
-              <a:noFill/>
-            </a:ln>
-            <a:effectLst>
-              <a:outerShdw blurRad="57240" dist="19080" dir="5400000" algn="bl" rotWithShape="0">
-                <a:srgbClr val="000000">
-                  <a:alpha val="50000"/>
-                </a:srgbClr>
-              </a:outerShdw>
-            </a:effectLst>
-          </p:spPr>
-        </p:pic>
-      </p:grpSp>
-      <p:pic>
-        <p:nvPicPr>
-          <p:cNvPr id="4" name="Imagem 3"/>
-          <p:cNvPicPr>
-            <a:picLocks noChangeAspect="1"/>
-          </p:cNvPicPr>
-          <p:nvPr/>
-        </p:nvPicPr>
-        <p:blipFill>
-          <a:blip r:embed="rId2"/>
-          <a:stretch>
-            <a:fillRect/>
-          </a:stretch>
-        </p:blipFill>
-        <p:spPr>
-          <a:xfrm>
-            <a:off x="6094730" y="2837180"/>
-            <a:ext cx="1999179" cy="763200"/>
-          </a:xfrm>
-          <a:prstGeom prst="rect">
-            <a:avLst/>
-          </a:prstGeom>
-        </p:spPr>
-      </p:pic>
-      <p:pic>
-        <p:nvPicPr>
-          <p:cNvPr id="5" name="Imagem 4"/>
-          <p:cNvPicPr>
-            <a:picLocks noChangeAspect="1"/>
-          </p:cNvPicPr>
-          <p:nvPr/>
-        </p:nvPicPr>
-        <p:blipFill>
-          <a:blip r:embed="rId3"/>
-          <a:srcRect t="5959"/>
-          <a:stretch>
-            <a:fillRect/>
-          </a:stretch>
-        </p:blipFill>
-        <p:spPr>
-          <a:xfrm>
-            <a:off x="6064885" y="1364615"/>
-            <a:ext cx="1922780" cy="762635"/>
-          </a:xfrm>
-          <a:prstGeom prst="rect">
-            <a:avLst/>
-          </a:prstGeom>
-        </p:spPr>
-      </p:pic>
-      <p:sp>
-        <p:nvSpPr>
-          <p:cNvPr id="6" name="Caixa de Texto 5"/>
-          <p:cNvSpPr txBox="1"/>
-          <p:nvPr/>
-        </p:nvSpPr>
-        <p:spPr>
-          <a:xfrm>
-            <a:off x="6702425" y="1895475"/>
-            <a:ext cx="648335" cy="245110"/>
-          </a:xfrm>
-          <a:prstGeom prst="rect">
-            <a:avLst/>
-          </a:prstGeom>
-          <a:noFill/>
-        </p:spPr>
-        <p:txBody>
-          <a:bodyPr wrap="none" rtlCol="0">
-            <a:spAutoFit/>
-          </a:bodyPr>
-          <a:p>
-            <a:r>
-              <a:rPr lang="pt-BR" sz="1000" kern="0">
-                <a:solidFill>
-                  <a:srgbClr val="3B3B3B"/>
-                </a:solidFill>
-                <a:latin typeface="Arial" panose="020B0604020202020204"/>
-                <a:ea typeface="Arial" panose="020B0604020202020204"/>
-                <a:cs typeface="+mn-ea"/>
-              </a:rPr>
-              <a:t>Figura 1</a:t>
-            </a:r>
-            <a:endParaRPr lang="pt-BR" altLang="en-US" sz="1000" kern="0">
-              <a:solidFill>
-                <a:srgbClr val="3B3B3B"/>
-              </a:solidFill>
-              <a:latin typeface="Arial" panose="020B0604020202020204"/>
-              <a:ea typeface="Arial" panose="020B0604020202020204"/>
-              <a:cs typeface="+mn-ea"/>
-            </a:endParaRPr>
-          </a:p>
-        </p:txBody>
-      </p:sp>
-      <p:sp>
-        <p:nvSpPr>
-          <p:cNvPr id="7" name="Caixa de Texto 6"/>
-          <p:cNvSpPr txBox="1"/>
-          <p:nvPr/>
-        </p:nvSpPr>
-        <p:spPr>
-          <a:xfrm>
-            <a:off x="6702425" y="3326130"/>
-            <a:ext cx="648335" cy="245110"/>
-          </a:xfrm>
-          <a:prstGeom prst="rect">
-            <a:avLst/>
-          </a:prstGeom>
-          <a:noFill/>
-        </p:spPr>
-        <p:txBody>
-          <a:bodyPr wrap="none" rtlCol="0">
-            <a:spAutoFit/>
-          </a:bodyPr>
-          <a:p>
-            <a:r>
-              <a:rPr lang="pt-BR" sz="1000" kern="0">
-                <a:solidFill>
-                  <a:srgbClr val="3B3B3B"/>
-                </a:solidFill>
-                <a:latin typeface="Arial" panose="020B0604020202020204"/>
-                <a:ea typeface="Arial" panose="020B0604020202020204"/>
-                <a:cs typeface="+mn-ea"/>
-              </a:rPr>
-              <a:t>Figura 2</a:t>
-            </a:r>
-            <a:endParaRPr lang="pt-BR" sz="1000" kern="0">
-              <a:solidFill>
-                <a:srgbClr val="3B3B3B"/>
-              </a:solidFill>
-              <a:latin typeface="Arial" panose="020B0604020202020204"/>
-              <a:ea typeface="Arial" panose="020B0604020202020204"/>
-              <a:cs typeface="+mn-ea"/>
-            </a:endParaRPr>
-          </a:p>
-        </p:txBody>
-      </p:sp>
-      <p:pic>
-        <p:nvPicPr>
-          <p:cNvPr id="8" name="Imagem 7"/>
-          <p:cNvPicPr>
-            <a:picLocks noChangeAspect="1"/>
-          </p:cNvPicPr>
-          <p:nvPr/>
-        </p:nvPicPr>
-        <p:blipFill>
-          <a:blip r:embed="rId4"/>
-          <a:srcRect b="14205"/>
-          <a:stretch>
-            <a:fillRect/>
-          </a:stretch>
-        </p:blipFill>
-        <p:spPr>
-          <a:xfrm>
-            <a:off x="6052185" y="840740"/>
-            <a:ext cx="2041525" cy="626110"/>
-          </a:xfrm>
-          <a:prstGeom prst="rect">
-            <a:avLst/>
-          </a:prstGeom>
-        </p:spPr>
-      </p:pic>
-      <p:pic>
-        <p:nvPicPr>
-          <p:cNvPr id="9" name="Imagem 8"/>
-          <p:cNvPicPr>
-            <a:picLocks noChangeAspect="1"/>
-          </p:cNvPicPr>
-          <p:nvPr/>
-        </p:nvPicPr>
-        <p:blipFill>
-          <a:blip r:embed="rId5"/>
-          <a:stretch>
-            <a:fillRect/>
-          </a:stretch>
-        </p:blipFill>
-        <p:spPr>
-          <a:xfrm>
-            <a:off x="6052185" y="2287905"/>
-            <a:ext cx="2041200" cy="650019"/>
-          </a:xfrm>
-          <a:prstGeom prst="rect">
-            <a:avLst/>
-          </a:prstGeom>
-        </p:spPr>
-      </p:pic>
-    </p:spTree>
-  </p:cSld>
-  <p:clrMapOvr>
-    <a:masterClrMapping/>
-  </p:clrMapOvr>
-  <p:transition spd="slow">
-    <p:fade/>
-  </p:transition>
-  <p:timing>
-    <p:tnLst>
-      <p:par>
-        <p:cTn id="1" dur="indefinite" restart="never" nodeType="tmRoot"/>
-      </p:par>
-    </p:tnLst>
-  </p:timing>
-</p:sld>
-</file>
-
-<file path=ppt/slides/slide18.xml><?xml version="1.0" encoding="utf-8"?>
-<p:sld xmlns:a="http://schemas.openxmlformats.org/drawingml/2006/main" xmlns:r="http://schemas.openxmlformats.org/officeDocument/2006/relationships" xmlns:p="http://schemas.openxmlformats.org/presentationml/2006/main">
-  <p:cSld>
-    <p:spTree>
-      <p:nvGrpSpPr>
-        <p:cNvPr id="1" name=""/>
-        <p:cNvGrpSpPr/>
-        <p:nvPr/>
-      </p:nvGrpSpPr>
-      <p:grpSpPr>
-        <a:xfrm>
-          <a:off x="0" y="0"/>
-          <a:ext cx="0" cy="0"/>
-          <a:chOff x="0" y="0"/>
-          <a:chExt cx="0" cy="0"/>
-        </a:xfrm>
-      </p:grpSpPr>
-      <p:sp>
-        <p:nvSpPr>
-          <p:cNvPr id="109" name="PlaceHolder 1"/>
-          <p:cNvSpPr>
-            <a:spLocks noGrp="1"/>
-          </p:cNvSpPr>
-          <p:nvPr>
-            <p:ph type="title"/>
-          </p:nvPr>
-        </p:nvSpPr>
-        <p:spPr>
-          <a:xfrm>
-            <a:off x="311760" y="82080"/>
-            <a:ext cx="8520120" cy="572400"/>
-          </a:xfrm>
-          <a:prstGeom prst="rect">
-            <a:avLst/>
-          </a:prstGeom>
-          <a:noFill/>
-          <a:ln w="0">
-            <a:noFill/>
-          </a:ln>
-        </p:spPr>
-        <p:txBody>
-          <a:bodyPr tIns="91440" bIns="91440" anchor="t">
-            <a:normAutofit fontScale="89000"/>
-          </a:bodyPr>
-          <a:p>
-            <a:pPr indent="0">
-              <a:lnSpc>
-                <a:spcPct val="115000"/>
-              </a:lnSpc>
-              <a:spcBef>
-                <a:spcPts val="1200"/>
-              </a:spcBef>
-              <a:spcAft>
-                <a:spcPts val="1200"/>
-              </a:spcAft>
-              <a:buNone/>
-              <a:tabLst>
-                <a:tab pos="0" algn="l"/>
-              </a:tabLst>
-            </a:pPr>
-            <a:r>
-              <a:rPr lang="pt-BR" sz="2500" b="1" i="1" strike="noStrike" spc="-1">
-                <a:solidFill>
-                  <a:srgbClr val="00315D"/>
-                </a:solidFill>
-                <a:latin typeface="Arial" panose="020B0604020202020204"/>
-                <a:ea typeface="Arial" panose="020B0604020202020204"/>
-              </a:rPr>
-              <a:t>Boas Práticas - Estruturação das bandas</a:t>
-            </a:r>
-            <a:endParaRPr lang="pt-BR" sz="2500" b="0" strike="noStrike" spc="-1">
-              <a:solidFill>
-                <a:srgbClr val="000000"/>
-              </a:solidFill>
-              <a:latin typeface="Arial" panose="020B0604020202020204"/>
-            </a:endParaRPr>
-          </a:p>
-        </p:txBody>
-      </p:sp>
-      <p:sp>
-        <p:nvSpPr>
-          <p:cNvPr id="110" name="PlaceHolder 2"/>
-          <p:cNvSpPr>
-            <a:spLocks noGrp="1"/>
-          </p:cNvSpPr>
-          <p:nvPr>
-            <p:ph/>
-          </p:nvPr>
-        </p:nvSpPr>
-        <p:spPr>
-          <a:xfrm>
-            <a:off x="541020" y="729615"/>
-            <a:ext cx="8375015" cy="4196080"/>
-          </a:xfrm>
-          <a:prstGeom prst="rect">
-            <a:avLst/>
-          </a:prstGeom>
-          <a:noFill/>
-          <a:ln w="0">
-            <a:noFill/>
-          </a:ln>
-        </p:spPr>
-        <p:txBody>
-          <a:bodyPr tIns="91440" bIns="91440" anchor="t">
-            <a:noAutofit/>
-          </a:bodyPr>
-          <a:p>
-            <a:pPr marL="457200" indent="-406400" algn="just">
-              <a:lnSpc>
-                <a:spcPct val="115000"/>
-              </a:lnSpc>
-              <a:buClr>
-                <a:srgbClr val="00315D"/>
-              </a:buClr>
-              <a:buFont typeface="Arial" panose="020B0604020202020204"/>
-              <a:buChar char="●"/>
-            </a:pPr>
-            <a:r>
-              <a:rPr lang="pt-BR" sz="1600" b="0" strike="noStrike">
-                <a:solidFill>
-                  <a:srgbClr val="3B3B3B"/>
-                </a:solidFill>
-                <a:latin typeface="Arial" panose="020B0604020202020204"/>
-                <a:ea typeface="Arial" panose="020B0604020202020204"/>
-                <a:sym typeface="+mn-ea"/>
-              </a:rPr>
-              <a:t>Ao iniciar a montagem do layout tenha o código SQL finalizado, ou pelo menos tenha em mente como vai ser feito e como vai ser exibido. Esse fator é importante na hora de escolher as bandas, para não acabar colocando banda errada, pois pode afetar no desempenho do relatório, por exemplo, colocar muitas bandas que rodam uma consulta SQL sendo que poderia substitui-las por bandas filhas. </a:t>
-            </a:r>
-            <a:endParaRPr lang="pt-BR" sz="1600" b="0" strike="noStrike">
-              <a:solidFill>
-                <a:srgbClr val="3B3B3B"/>
-              </a:solidFill>
-              <a:latin typeface="Arial" panose="020B0604020202020204"/>
-              <a:ea typeface="Arial" panose="020B0604020202020204"/>
-              <a:sym typeface="+mn-ea"/>
-            </a:endParaRPr>
-          </a:p>
-          <a:p>
-            <a:pPr marL="457200" indent="-406400" algn="just">
-              <a:lnSpc>
-                <a:spcPct val="115000"/>
-              </a:lnSpc>
-              <a:buClr>
-                <a:srgbClr val="00315D"/>
-              </a:buClr>
-              <a:buFont typeface="Arial" panose="020B0604020202020204"/>
-              <a:buChar char="●"/>
-            </a:pPr>
-            <a:r>
-              <a:rPr lang="pt-BR" sz="1600" b="0" strike="noStrike">
-                <a:solidFill>
-                  <a:srgbClr val="3B3B3B"/>
-                </a:solidFill>
-                <a:latin typeface="Arial" panose="020B0604020202020204"/>
-                <a:ea typeface="Arial" panose="020B0604020202020204"/>
-                <a:sym typeface="+mn-ea"/>
-              </a:rPr>
-              <a:t>Será abordado mais a respeito das bandas, tópicos como: </a:t>
-            </a:r>
-            <a:endParaRPr lang="pt-BR" sz="1600" b="0" strike="noStrike">
-              <a:solidFill>
-                <a:srgbClr val="3B3B3B"/>
-              </a:solidFill>
-              <a:latin typeface="Arial" panose="020B0604020202020204"/>
-              <a:ea typeface="Arial" panose="020B0604020202020204"/>
-              <a:sym typeface="+mn-ea"/>
-            </a:endParaRPr>
-          </a:p>
-          <a:p>
-            <a:pPr marL="914400" lvl="1" indent="-406400" algn="just">
-              <a:lnSpc>
-                <a:spcPct val="115000"/>
-              </a:lnSpc>
-              <a:buClr>
-                <a:srgbClr val="00315D"/>
-              </a:buClr>
-              <a:buFont typeface="Arial" panose="020B0604020202020204"/>
-              <a:buChar char="●"/>
-            </a:pPr>
-            <a:r>
-              <a:rPr lang="pt-BR" sz="1600" b="0" strike="noStrike">
-                <a:solidFill>
-                  <a:srgbClr val="3B3B3B"/>
-                </a:solidFill>
-                <a:latin typeface="Arial" panose="020B0604020202020204"/>
-                <a:ea typeface="Arial" panose="020B0604020202020204"/>
-                <a:sym typeface="+mn-ea"/>
-              </a:rPr>
-              <a:t>O que são.</a:t>
-            </a:r>
-            <a:endParaRPr lang="pt-BR" sz="1600" b="0" strike="noStrike">
-              <a:solidFill>
-                <a:srgbClr val="3B3B3B"/>
-              </a:solidFill>
-              <a:latin typeface="Arial" panose="020B0604020202020204"/>
-              <a:ea typeface="Arial" panose="020B0604020202020204"/>
-              <a:sym typeface="+mn-ea"/>
-            </a:endParaRPr>
-          </a:p>
-          <a:p>
-            <a:pPr marL="914400" lvl="1" indent="-406400" algn="just">
-              <a:lnSpc>
-                <a:spcPct val="115000"/>
-              </a:lnSpc>
-              <a:buClr>
-                <a:srgbClr val="00315D"/>
-              </a:buClr>
-              <a:buFont typeface="Arial" panose="020B0604020202020204"/>
-              <a:buChar char="●"/>
-            </a:pPr>
-            <a:r>
-              <a:rPr lang="pt-BR" sz="1600" b="0" strike="noStrike">
-                <a:solidFill>
-                  <a:srgbClr val="3B3B3B"/>
-                </a:solidFill>
-                <a:latin typeface="Arial" panose="020B0604020202020204"/>
-                <a:ea typeface="Arial" panose="020B0604020202020204"/>
-                <a:sym typeface="+mn-ea"/>
-              </a:rPr>
-              <a:t>Quais os tipos mais utilizados, e como funcionam.</a:t>
-            </a:r>
-            <a:endParaRPr lang="pt-BR" sz="1600" b="0" strike="noStrike">
-              <a:solidFill>
-                <a:srgbClr val="3B3B3B"/>
-              </a:solidFill>
-              <a:latin typeface="Arial" panose="020B0604020202020204"/>
-              <a:ea typeface="Arial" panose="020B0604020202020204"/>
-              <a:sym typeface="+mn-ea"/>
-            </a:endParaRPr>
-          </a:p>
-          <a:p>
-            <a:pPr marL="457200" indent="-406400" algn="just">
-              <a:lnSpc>
-                <a:spcPct val="115000"/>
-              </a:lnSpc>
-              <a:buClr>
-                <a:srgbClr val="00315D"/>
-              </a:buClr>
-              <a:buFont typeface="Arial" panose="020B0604020202020204"/>
-              <a:buChar char="●"/>
-            </a:pPr>
-            <a:endParaRPr lang="pt-BR" sz="1000" b="1" strike="noStrike" spc="-1">
-              <a:solidFill>
-                <a:srgbClr val="00315D"/>
-              </a:solidFill>
-              <a:latin typeface="Arial" panose="020B0604020202020204"/>
-              <a:ea typeface="Arial" panose="020B0604020202020204"/>
-              <a:sym typeface="+mn-ea"/>
-            </a:endParaRPr>
-          </a:p>
-        </p:txBody>
-      </p:sp>
-      <p:grpSp>
-        <p:nvGrpSpPr>
-          <p:cNvPr id="111" name="Google Shape;96;p17"/>
-          <p:cNvGrpSpPr/>
-          <p:nvPr/>
-        </p:nvGrpSpPr>
-        <p:grpSpPr>
-          <a:xfrm>
-            <a:off x="-360" y="4570920"/>
-            <a:ext cx="9144000" cy="596520"/>
-            <a:chOff x="-360" y="4570920"/>
-            <a:chExt cx="9144000" cy="596520"/>
-          </a:xfrm>
-        </p:grpSpPr>
-        <p:sp>
-          <p:nvSpPr>
-            <p:cNvPr id="112" name="Google Shape;97;p17"/>
-            <p:cNvSpPr/>
-            <p:nvPr/>
-          </p:nvSpPr>
-          <p:spPr>
-            <a:xfrm flipH="1">
-              <a:off x="-720" y="4570920"/>
-              <a:ext cx="9143640" cy="572400"/>
-            </a:xfrm>
-            <a:prstGeom prst="rtTriangle">
-              <a:avLst/>
-            </a:prstGeom>
-            <a:gradFill rotWithShape="0">
-              <a:gsLst>
-                <a:gs pos="0">
-                  <a:srgbClr val="DFE9FB"/>
-                </a:gs>
-                <a:gs pos="100000">
-                  <a:srgbClr val="6E9BE7"/>
-                </a:gs>
-              </a:gsLst>
-              <a:lin ang="5394000"/>
-            </a:gradFill>
-            <a:ln w="0">
-              <a:noFill/>
-            </a:ln>
-          </p:spPr>
-          <p:style>
-            <a:lnRef idx="0">
-              <a:srgbClr val="FFFFFF"/>
-            </a:lnRef>
-            <a:fillRef idx="0">
-              <a:srgbClr val="FFFFFF"/>
-            </a:fillRef>
-            <a:effectRef idx="0">
-              <a:srgbClr val="FFFFFF"/>
-            </a:effectRef>
-            <a:fontRef idx="minor"/>
-          </p:style>
-          <p:txBody>
-            <a:bodyPr tIns="91440" bIns="91440" anchor="ctr">
-              <a:noAutofit/>
-            </a:bodyPr>
-            <a:p>
-              <a:pPr>
-                <a:lnSpc>
-                  <a:spcPct val="100000"/>
-                </a:lnSpc>
-                <a:tabLst>
-                  <a:tab pos="0" algn="l"/>
-                </a:tabLst>
-              </a:pPr>
-              <a:endParaRPr lang="pt-BR" sz="1400" b="0" strike="noStrike" spc="-1">
-                <a:solidFill>
-                  <a:srgbClr val="000000"/>
-                </a:solidFill>
-                <a:latin typeface="Arial" panose="020B0604020202020204"/>
-                <a:ea typeface="Arial" panose="020B0604020202020204"/>
-              </a:endParaRPr>
-            </a:p>
-          </p:txBody>
-        </p:sp>
-        <p:sp>
-          <p:nvSpPr>
-            <p:cNvPr id="113" name="Google Shape;98;p17"/>
-            <p:cNvSpPr/>
-            <p:nvPr/>
-          </p:nvSpPr>
-          <p:spPr>
-            <a:xfrm>
-              <a:off x="0" y="4570920"/>
-              <a:ext cx="9143640" cy="572400"/>
-            </a:xfrm>
-            <a:prstGeom prst="rtTriangle">
-              <a:avLst/>
-            </a:prstGeom>
-            <a:gradFill rotWithShape="0">
-              <a:gsLst>
-                <a:gs pos="0">
-                  <a:srgbClr val="00315D"/>
-                </a:gs>
-                <a:gs pos="100000">
-                  <a:srgbClr val="1155CC"/>
-                </a:gs>
-              </a:gsLst>
-              <a:lin ang="2700000"/>
-            </a:gradFill>
-            <a:ln w="0">
-              <a:noFill/>
-            </a:ln>
-          </p:spPr>
-          <p:style>
-            <a:lnRef idx="0">
-              <a:srgbClr val="FFFFFF"/>
-            </a:lnRef>
-            <a:fillRef idx="0">
-              <a:srgbClr val="FFFFFF"/>
-            </a:fillRef>
-            <a:effectRef idx="0">
-              <a:srgbClr val="FFFFFF"/>
-            </a:effectRef>
-            <a:fontRef idx="minor"/>
-          </p:style>
-          <p:txBody>
-            <a:bodyPr tIns="91440" bIns="91440" anchor="ctr">
-              <a:noAutofit/>
-            </a:bodyPr>
-            <a:p>
-              <a:pPr>
-                <a:lnSpc>
-                  <a:spcPct val="100000"/>
-                </a:lnSpc>
-                <a:tabLst>
-                  <a:tab pos="0" algn="l"/>
-                </a:tabLst>
-              </a:pPr>
-              <a:endParaRPr lang="pt-BR" sz="1400" b="0" strike="noStrike" spc="-1">
-                <a:solidFill>
-                  <a:srgbClr val="000000"/>
-                </a:solidFill>
-                <a:latin typeface="Arial" panose="020B0604020202020204"/>
-                <a:ea typeface="Arial" panose="020B0604020202020204"/>
-              </a:endParaRPr>
-            </a:p>
-          </p:txBody>
-        </p:sp>
-        <p:pic>
-          <p:nvPicPr>
-            <p:cNvPr id="114" name="Google Shape;99;p17"/>
-            <p:cNvPicPr/>
-            <p:nvPr/>
-          </p:nvPicPr>
-          <p:blipFill>
-            <a:blip r:embed="rId1"/>
-            <a:stretch>
-              <a:fillRect/>
-            </a:stretch>
-          </p:blipFill>
-          <p:spPr>
-            <a:xfrm>
-              <a:off x="117000" y="4700520"/>
-              <a:ext cx="1223280" cy="466920"/>
-            </a:xfrm>
-            <a:prstGeom prst="rect">
-              <a:avLst/>
-            </a:prstGeom>
-            <a:ln w="0">
-              <a:noFill/>
-            </a:ln>
-            <a:effectLst>
-              <a:outerShdw blurRad="57240" dist="19080" dir="5400000" algn="bl" rotWithShape="0">
-                <a:srgbClr val="000000">
-                  <a:alpha val="50000"/>
-                </a:srgbClr>
-              </a:outerShdw>
-            </a:effectLst>
-          </p:spPr>
-        </p:pic>
-      </p:grpSp>
-    </p:spTree>
-  </p:cSld>
-  <p:clrMapOvr>
-    <a:masterClrMapping/>
-  </p:clrMapOvr>
-  <p:transition spd="slow">
-    <p:fade/>
-  </p:transition>
-  <p:timing>
-    <p:tnLst>
-      <p:par>
-        <p:cTn id="1" dur="indefinite" restart="never" nodeType="tmRoot"/>
-      </p:par>
-    </p:tnLst>
-  </p:timing>
-</p:sld>
-</file>
-
-<file path=ppt/slides/slide19.xml><?xml version="1.0" encoding="utf-8"?>
-<p:sld xmlns:a="http://schemas.openxmlformats.org/drawingml/2006/main" xmlns:r="http://schemas.openxmlformats.org/officeDocument/2006/relationships" xmlns:p="http://schemas.openxmlformats.org/presentationml/2006/main">
-  <p:cSld>
-    <p:spTree>
-      <p:nvGrpSpPr>
-        <p:cNvPr id="1" name=""/>
-        <p:cNvGrpSpPr/>
-        <p:nvPr/>
-      </p:nvGrpSpPr>
-      <p:grpSpPr>
-        <a:xfrm>
-          <a:off x="0" y="0"/>
-          <a:ext cx="0" cy="0"/>
-          <a:chOff x="0" y="0"/>
-          <a:chExt cx="0" cy="0"/>
-        </a:xfrm>
-      </p:grpSpPr>
-      <p:sp>
-        <p:nvSpPr>
-          <p:cNvPr id="109" name="PlaceHolder 1"/>
-          <p:cNvSpPr>
-            <a:spLocks noGrp="1"/>
-          </p:cNvSpPr>
-          <p:nvPr>
-            <p:ph type="title"/>
-          </p:nvPr>
-        </p:nvSpPr>
-        <p:spPr>
-          <a:xfrm>
-            <a:off x="311760" y="284305"/>
-            <a:ext cx="8520120" cy="572400"/>
-          </a:xfrm>
-          <a:prstGeom prst="rect">
-            <a:avLst/>
-          </a:prstGeom>
-          <a:noFill/>
-          <a:ln w="0">
-            <a:noFill/>
-          </a:ln>
-        </p:spPr>
-        <p:txBody>
-          <a:bodyPr tIns="91440" bIns="91440" anchor="t">
-            <a:normAutofit fontScale="89000"/>
-          </a:bodyPr>
-          <a:p>
-            <a:pPr indent="0">
-              <a:lnSpc>
-                <a:spcPct val="115000"/>
-              </a:lnSpc>
-              <a:spcBef>
-                <a:spcPts val="1200"/>
-              </a:spcBef>
-              <a:spcAft>
-                <a:spcPts val="1200"/>
-              </a:spcAft>
-              <a:buNone/>
-              <a:tabLst>
-                <a:tab pos="0" algn="l"/>
-              </a:tabLst>
-            </a:pPr>
-            <a:r>
-              <a:rPr lang="pt-BR" sz="2500" b="1" i="1" strike="noStrike" spc="-1">
-                <a:solidFill>
-                  <a:srgbClr val="00315D"/>
-                </a:solidFill>
-                <a:latin typeface="Arial" panose="020B0604020202020204"/>
-                <a:ea typeface="Arial" panose="020B0604020202020204"/>
-              </a:rPr>
-              <a:t>Boas Práticas - Pense no próximo</a:t>
-            </a:r>
-            <a:endParaRPr lang="pt-BR" sz="2500" b="0" strike="noStrike" spc="-1">
-              <a:solidFill>
-                <a:srgbClr val="000000"/>
-              </a:solidFill>
-              <a:latin typeface="Arial" panose="020B0604020202020204"/>
-            </a:endParaRPr>
-          </a:p>
-        </p:txBody>
-      </p:sp>
-      <p:sp>
-        <p:nvSpPr>
-          <p:cNvPr id="110" name="PlaceHolder 2"/>
-          <p:cNvSpPr>
-            <a:spLocks noGrp="1"/>
-          </p:cNvSpPr>
-          <p:nvPr>
-            <p:ph/>
-          </p:nvPr>
-        </p:nvSpPr>
-        <p:spPr>
-          <a:xfrm>
-            <a:off x="311785" y="803275"/>
-            <a:ext cx="8520430" cy="1850390"/>
-          </a:xfrm>
-          <a:prstGeom prst="rect">
-            <a:avLst/>
-          </a:prstGeom>
-          <a:noFill/>
-          <a:ln w="0">
-            <a:noFill/>
-          </a:ln>
-        </p:spPr>
-        <p:txBody>
-          <a:bodyPr tIns="91440" bIns="91440" anchor="t">
-            <a:noAutofit/>
-          </a:bodyPr>
-          <a:p>
-            <a:pPr marL="457200" indent="-406400" algn="just">
-              <a:lnSpc>
-                <a:spcPct val="115000"/>
-              </a:lnSpc>
-              <a:buClr>
-                <a:srgbClr val="00315D"/>
-              </a:buClr>
-              <a:buFont typeface="Arial" panose="020B0604020202020204"/>
-              <a:buChar char="●"/>
-            </a:pPr>
-            <a:r>
-              <a:rPr lang="pt-BR" sz="1600" b="0" strike="noStrike">
-                <a:solidFill>
-                  <a:srgbClr val="3B3B3B"/>
-                </a:solidFill>
-                <a:latin typeface="Arial" panose="020B0604020202020204"/>
-                <a:ea typeface="Arial" panose="020B0604020202020204"/>
-                <a:sym typeface="+mn-ea"/>
-              </a:rPr>
-              <a:t>Eventualmente outra pessoa vai acabar editando o seu relatório, então qualquer coisa que achar pertinente faça uma anotação ! Por exemplo:</a:t>
-            </a:r>
-            <a:endParaRPr lang="pt-BR" sz="1600" b="0" strike="noStrike">
-              <a:solidFill>
-                <a:srgbClr val="3B3B3B"/>
-              </a:solidFill>
-              <a:latin typeface="Arial" panose="020B0604020202020204"/>
-              <a:ea typeface="Arial" panose="020B0604020202020204"/>
-              <a:sym typeface="+mn-ea"/>
-            </a:endParaRPr>
-          </a:p>
-          <a:p>
-            <a:pPr marL="914400" lvl="1" indent="-406400" algn="just">
-              <a:lnSpc>
-                <a:spcPct val="115000"/>
-              </a:lnSpc>
-              <a:buClr>
-                <a:srgbClr val="00315D"/>
-              </a:buClr>
-              <a:buFont typeface="Arial" panose="020B0604020202020204"/>
-              <a:buChar char="●"/>
-            </a:pPr>
-            <a:r>
-              <a:rPr lang="pt-BR" sz="1600" b="0" strike="noStrike">
-                <a:solidFill>
-                  <a:srgbClr val="3B3B3B"/>
-                </a:solidFill>
-                <a:latin typeface="Arial" panose="020B0604020202020204"/>
-                <a:ea typeface="Arial" panose="020B0604020202020204"/>
-                <a:sym typeface="+mn-ea"/>
-              </a:rPr>
-              <a:t>Parametros com valores específicos, que só aceitam 0 (zero) ou 1 como entrada.</a:t>
-            </a:r>
-            <a:endParaRPr lang="pt-BR" sz="1600" b="0" strike="noStrike">
-              <a:solidFill>
-                <a:srgbClr val="3B3B3B"/>
-              </a:solidFill>
-              <a:latin typeface="Arial" panose="020B0604020202020204"/>
-              <a:ea typeface="Arial" panose="020B0604020202020204"/>
-              <a:sym typeface="+mn-ea"/>
-            </a:endParaRPr>
-          </a:p>
-          <a:p>
-            <a:pPr marL="914400" lvl="1" indent="-406400" algn="just">
-              <a:lnSpc>
-                <a:spcPct val="115000"/>
-              </a:lnSpc>
-              <a:buClr>
-                <a:srgbClr val="00315D"/>
-              </a:buClr>
-              <a:buFont typeface="Arial" panose="020B0604020202020204"/>
-              <a:buChar char="●"/>
-            </a:pPr>
-            <a:r>
-              <a:rPr lang="pt-BR" sz="1600" b="0" strike="noStrike">
-                <a:solidFill>
-                  <a:srgbClr val="3B3B3B"/>
-                </a:solidFill>
-                <a:latin typeface="Arial" panose="020B0604020202020204"/>
-                <a:ea typeface="Arial" panose="020B0604020202020204"/>
-                <a:sym typeface="+mn-ea"/>
-              </a:rPr>
-              <a:t>Sentenças SQL extensas e complexas.</a:t>
-            </a:r>
-            <a:endParaRPr lang="pt-BR" sz="1600" b="0" strike="noStrike">
-              <a:solidFill>
-                <a:srgbClr val="3B3B3B"/>
-              </a:solidFill>
-              <a:latin typeface="Arial" panose="020B0604020202020204"/>
-              <a:ea typeface="Arial" panose="020B0604020202020204"/>
-              <a:sym typeface="+mn-ea"/>
-            </a:endParaRPr>
-          </a:p>
-          <a:p>
-            <a:pPr marL="914400" lvl="1" indent="-406400" algn="just">
-              <a:lnSpc>
-                <a:spcPct val="115000"/>
-              </a:lnSpc>
-              <a:buClr>
-                <a:srgbClr val="00315D"/>
-              </a:buClr>
-              <a:buFont typeface="Arial" panose="020B0604020202020204"/>
-              <a:buChar char="●"/>
-            </a:pPr>
-            <a:r>
-              <a:rPr lang="pt-BR" sz="1600" b="0" strike="noStrike" spc="-1">
-                <a:solidFill>
-                  <a:srgbClr val="3B3B3B"/>
-                </a:solidFill>
-                <a:latin typeface="Arial" panose="020B0604020202020204"/>
-                <a:ea typeface="Arial" panose="020B0604020202020204"/>
-                <a:sym typeface="+mn-ea"/>
-              </a:rPr>
-              <a:t>Em que tabela encontrar os parâmetros para teste.</a:t>
-            </a:r>
-            <a:endParaRPr lang="pt-BR" sz="1600" b="0" strike="noStrike" spc="-1">
-              <a:solidFill>
-                <a:srgbClr val="3B3B3B"/>
-              </a:solidFill>
-              <a:latin typeface="Arial" panose="020B0604020202020204"/>
-              <a:ea typeface="Arial" panose="020B0604020202020204"/>
-              <a:sym typeface="+mn-ea"/>
-            </a:endParaRPr>
-          </a:p>
-          <a:p>
-            <a:pPr marL="508000" lvl="1" indent="0" algn="just">
-              <a:lnSpc>
-                <a:spcPct val="115000"/>
-              </a:lnSpc>
-              <a:buClr>
-                <a:srgbClr val="00315D"/>
-              </a:buClr>
-              <a:buFont typeface="Arial" panose="020B0604020202020204"/>
-              <a:buNone/>
-            </a:pPr>
-            <a:r>
-              <a:rPr lang="pt-BR" sz="1600" b="0" strike="noStrike" spc="-1">
-                <a:solidFill>
-                  <a:srgbClr val="3B3B3B"/>
-                </a:solidFill>
-                <a:latin typeface="Arial" panose="020B0604020202020204"/>
-                <a:ea typeface="Arial" panose="020B0604020202020204"/>
-                <a:sym typeface="+mn-ea"/>
-              </a:rPr>
-              <a:t>Por exemplo:</a:t>
-            </a:r>
-            <a:endParaRPr lang="pt-BR" sz="1600" b="0" strike="noStrike" spc="-1">
-              <a:solidFill>
-                <a:srgbClr val="3B3B3B"/>
-              </a:solidFill>
-              <a:latin typeface="Arial" panose="020B0604020202020204"/>
-              <a:ea typeface="Arial" panose="020B0604020202020204"/>
-              <a:sym typeface="+mn-ea"/>
-            </a:endParaRPr>
-          </a:p>
-        </p:txBody>
-      </p:sp>
-      <p:grpSp>
-        <p:nvGrpSpPr>
-          <p:cNvPr id="111" name="Google Shape;96;p17"/>
-          <p:cNvGrpSpPr/>
-          <p:nvPr/>
-        </p:nvGrpSpPr>
-        <p:grpSpPr>
-          <a:xfrm>
-            <a:off x="-360" y="4570920"/>
-            <a:ext cx="9144000" cy="596520"/>
-            <a:chOff x="-360" y="4570920"/>
-            <a:chExt cx="9144000" cy="596520"/>
-          </a:xfrm>
-        </p:grpSpPr>
-        <p:sp>
-          <p:nvSpPr>
-            <p:cNvPr id="112" name="Google Shape;97;p17"/>
-            <p:cNvSpPr/>
-            <p:nvPr/>
-          </p:nvSpPr>
-          <p:spPr>
-            <a:xfrm flipH="1">
-              <a:off x="-720" y="4570920"/>
-              <a:ext cx="9143640" cy="572400"/>
-            </a:xfrm>
-            <a:prstGeom prst="rtTriangle">
-              <a:avLst/>
-            </a:prstGeom>
-            <a:gradFill rotWithShape="0">
-              <a:gsLst>
-                <a:gs pos="0">
-                  <a:srgbClr val="DFE9FB"/>
-                </a:gs>
-                <a:gs pos="100000">
-                  <a:srgbClr val="6E9BE7"/>
-                </a:gs>
-              </a:gsLst>
-              <a:lin ang="5394000"/>
-            </a:gradFill>
-            <a:ln w="0">
-              <a:noFill/>
-            </a:ln>
-          </p:spPr>
-          <p:style>
-            <a:lnRef idx="0">
-              <a:srgbClr val="FFFFFF"/>
-            </a:lnRef>
-            <a:fillRef idx="0">
-              <a:srgbClr val="FFFFFF"/>
-            </a:fillRef>
-            <a:effectRef idx="0">
-              <a:srgbClr val="FFFFFF"/>
-            </a:effectRef>
-            <a:fontRef idx="minor"/>
-          </p:style>
-          <p:txBody>
-            <a:bodyPr tIns="91440" bIns="91440" anchor="ctr">
-              <a:noAutofit/>
-            </a:bodyPr>
-            <a:p>
-              <a:pPr>
-                <a:lnSpc>
-                  <a:spcPct val="100000"/>
-                </a:lnSpc>
-                <a:tabLst>
-                  <a:tab pos="0" algn="l"/>
-                </a:tabLst>
-              </a:pPr>
-              <a:endParaRPr lang="pt-BR" sz="1400" b="0" strike="noStrike" spc="-1">
-                <a:solidFill>
-                  <a:srgbClr val="000000"/>
-                </a:solidFill>
-                <a:latin typeface="Arial" panose="020B0604020202020204"/>
-                <a:ea typeface="Arial" panose="020B0604020202020204"/>
-              </a:endParaRPr>
-            </a:p>
-          </p:txBody>
-        </p:sp>
-        <p:sp>
-          <p:nvSpPr>
-            <p:cNvPr id="113" name="Google Shape;98;p17"/>
-            <p:cNvSpPr/>
-            <p:nvPr/>
-          </p:nvSpPr>
-          <p:spPr>
-            <a:xfrm>
-              <a:off x="0" y="4570920"/>
-              <a:ext cx="9143640" cy="572400"/>
-            </a:xfrm>
-            <a:prstGeom prst="rtTriangle">
-              <a:avLst/>
-            </a:prstGeom>
-            <a:gradFill rotWithShape="0">
-              <a:gsLst>
-                <a:gs pos="0">
-                  <a:srgbClr val="00315D"/>
-                </a:gs>
-                <a:gs pos="100000">
-                  <a:srgbClr val="1155CC"/>
-                </a:gs>
-              </a:gsLst>
-              <a:lin ang="2700000"/>
-            </a:gradFill>
-            <a:ln w="0">
-              <a:noFill/>
-            </a:ln>
-          </p:spPr>
-          <p:style>
-            <a:lnRef idx="0">
-              <a:srgbClr val="FFFFFF"/>
-            </a:lnRef>
-            <a:fillRef idx="0">
-              <a:srgbClr val="FFFFFF"/>
-            </a:fillRef>
-            <a:effectRef idx="0">
-              <a:srgbClr val="FFFFFF"/>
-            </a:effectRef>
-            <a:fontRef idx="minor"/>
-          </p:style>
-          <p:txBody>
-            <a:bodyPr tIns="91440" bIns="91440" anchor="ctr">
-              <a:noAutofit/>
-            </a:bodyPr>
-            <a:p>
-              <a:pPr>
-                <a:lnSpc>
-                  <a:spcPct val="100000"/>
-                </a:lnSpc>
-                <a:tabLst>
-                  <a:tab pos="0" algn="l"/>
-                </a:tabLst>
-              </a:pPr>
-              <a:endParaRPr lang="pt-BR" sz="1400" b="0" strike="noStrike" spc="-1">
-                <a:solidFill>
-                  <a:srgbClr val="000000"/>
-                </a:solidFill>
-                <a:latin typeface="Arial" panose="020B0604020202020204"/>
-                <a:ea typeface="Arial" panose="020B0604020202020204"/>
-              </a:endParaRPr>
-            </a:p>
-          </p:txBody>
-        </p:sp>
-        <p:pic>
-          <p:nvPicPr>
-            <p:cNvPr id="114" name="Google Shape;99;p17"/>
-            <p:cNvPicPr/>
-            <p:nvPr/>
-          </p:nvPicPr>
-          <p:blipFill>
-            <a:blip r:embed="rId1"/>
-            <a:stretch>
-              <a:fillRect/>
-            </a:stretch>
-          </p:blipFill>
-          <p:spPr>
-            <a:xfrm>
-              <a:off x="117000" y="4700520"/>
-              <a:ext cx="1223280" cy="466920"/>
-            </a:xfrm>
-            <a:prstGeom prst="rect">
-              <a:avLst/>
-            </a:prstGeom>
-            <a:ln w="0">
-              <a:noFill/>
-            </a:ln>
-            <a:effectLst>
-              <a:outerShdw blurRad="57240" dist="19080" dir="5400000" algn="bl" rotWithShape="0">
-                <a:srgbClr val="000000">
-                  <a:alpha val="50000"/>
-                </a:srgbClr>
-              </a:outerShdw>
-            </a:effectLst>
-          </p:spPr>
-        </p:pic>
-      </p:grpSp>
-      <p:pic>
-        <p:nvPicPr>
-          <p:cNvPr id="2" name="Espaço Reservado para Conteúdo 1"/>
-          <p:cNvPicPr>
-            <a:picLocks noChangeAspect="1"/>
-          </p:cNvPicPr>
-          <p:nvPr>
-            <p:ph/>
-          </p:nvPr>
-        </p:nvPicPr>
-        <p:blipFill>
-          <a:blip r:embed="rId2"/>
-          <a:stretch>
-            <a:fillRect/>
-          </a:stretch>
-        </p:blipFill>
-        <p:spPr>
-          <a:xfrm>
-            <a:off x="2338070" y="2778760"/>
-            <a:ext cx="4523740" cy="1921510"/>
-          </a:xfrm>
-          <a:prstGeom prst="rect">
-            <a:avLst/>
-          </a:prstGeom>
-        </p:spPr>
-      </p:pic>
-    </p:spTree>
-  </p:cSld>
-  <p:clrMapOvr>
-    <a:masterClrMapping/>
-  </p:clrMapOvr>
-  <p:transition spd="slow">
-    <p:fade/>
-  </p:transition>
   <p:timing>
     <p:tnLst>
       <p:par>
@@ -10725,7 +8062,7 @@
         </p:blipFill>
         <p:spPr>
           <a:xfrm>
-            <a:off x="1547495" y="123825"/>
+            <a:off x="35560" y="51435"/>
             <a:ext cx="5795645" cy="4455160"/>
           </a:xfrm>
           <a:prstGeom prst="rect">
@@ -10733,6 +8070,204 @@
           </a:prstGeom>
         </p:spPr>
       </p:pic>
+      <p:sp>
+        <p:nvSpPr>
+          <p:cNvPr id="2" name="Caixa de Texto 1"/>
+          <p:cNvSpPr txBox="1"/>
+          <p:nvPr/>
+        </p:nvSpPr>
+        <p:spPr>
+          <a:xfrm>
+            <a:off x="5893435" y="39370"/>
+            <a:ext cx="3232150" cy="3784600"/>
+          </a:xfrm>
+          <a:prstGeom prst="rect">
+            <a:avLst/>
+          </a:prstGeom>
+          <a:noFill/>
+        </p:spPr>
+        <p:txBody>
+          <a:bodyPr wrap="square" rtlCol="0">
+            <a:spAutoFit/>
+          </a:bodyPr>
+          <a:p>
+            <a:pPr marL="0" indent="0" algn="just">
+              <a:buFont typeface="Arial" panose="020B0604020202020204" pitchFamily="34" charset="0"/>
+              <a:buNone/>
+            </a:pPr>
+            <a:r>
+              <a:rPr lang="pt-BR" sz="1200" b="1" kern="0">
+                <a:solidFill>
+                  <a:srgbClr val="00315D"/>
+                </a:solidFill>
+                <a:latin typeface="Arial" panose="020B0604020202020204"/>
+                <a:ea typeface="Arial" panose="020B0604020202020204"/>
+                <a:cs typeface="+mn-ea"/>
+                <a:sym typeface="+mn-ea"/>
+              </a:rPr>
+              <a:t>Legenda dos recursos do designer de relatórios:</a:t>
+            </a:r>
+            <a:endParaRPr lang="pt-BR" sz="1200" b="1" kern="0">
+              <a:solidFill>
+                <a:srgbClr val="00315D"/>
+              </a:solidFill>
+              <a:latin typeface="Arial" panose="020B0604020202020204"/>
+              <a:ea typeface="Arial" panose="020B0604020202020204"/>
+              <a:cs typeface="+mn-ea"/>
+              <a:sym typeface="+mn-ea"/>
+            </a:endParaRPr>
+          </a:p>
+          <a:p>
+            <a:pPr marL="0" indent="0" algn="just">
+              <a:buFont typeface="Arial" panose="020B0604020202020204" pitchFamily="34" charset="0"/>
+              <a:buNone/>
+            </a:pPr>
+            <a:endParaRPr lang="pt-BR" altLang="en-US" sz="1200">
+              <a:sym typeface="+mn-ea"/>
+            </a:endParaRPr>
+          </a:p>
+          <a:p>
+            <a:pPr marL="0" indent="0" algn="just">
+              <a:buFont typeface="Arial" panose="020B0604020202020204" pitchFamily="34" charset="0"/>
+              <a:buNone/>
+            </a:pPr>
+            <a:endParaRPr lang="pt-BR" altLang="en-US" sz="1200"/>
+          </a:p>
+          <a:p>
+            <a:pPr marL="0" indent="0" algn="just">
+              <a:buFont typeface="Arial" panose="020B0604020202020204" pitchFamily="34" charset="0"/>
+              <a:buNone/>
+            </a:pPr>
+            <a:r>
+              <a:rPr lang="pt-BR" altLang="en-US" sz="1200">
+                <a:sym typeface="+mn-ea"/>
+              </a:rPr>
+              <a:t>1 - Área de trabalho para criar o design do relatório (folha padrão é a A4);</a:t>
+            </a:r>
+            <a:endParaRPr lang="pt-BR" altLang="en-US" sz="1200"/>
+          </a:p>
+          <a:p>
+            <a:pPr marL="0" indent="0" algn="just">
+              <a:buFont typeface="Arial" panose="020B0604020202020204" pitchFamily="34" charset="0"/>
+              <a:buNone/>
+            </a:pPr>
+            <a:r>
+              <a:rPr lang="pt-BR" altLang="en-US" sz="1200">
+                <a:sym typeface="+mn-ea"/>
+              </a:rPr>
+              <a:t>2 - Barra do menu;</a:t>
+            </a:r>
+            <a:endParaRPr lang="pt-BR" altLang="en-US" sz="1200"/>
+          </a:p>
+          <a:p>
+            <a:pPr marL="0" indent="0" algn="just">
+              <a:buFont typeface="Arial" panose="020B0604020202020204" pitchFamily="34" charset="0"/>
+              <a:buNone/>
+            </a:pPr>
+            <a:r>
+              <a:rPr lang="pt-BR" altLang="en-US" sz="1200">
+                <a:sym typeface="+mn-ea"/>
+              </a:rPr>
+              <a:t>3 - Barra de ferramentas;</a:t>
+            </a:r>
+            <a:endParaRPr lang="pt-BR" altLang="en-US" sz="1200"/>
+          </a:p>
+          <a:p>
+            <a:pPr marL="0" indent="0" algn="just">
+              <a:buFont typeface="Arial" panose="020B0604020202020204" pitchFamily="34" charset="0"/>
+              <a:buNone/>
+            </a:pPr>
+            <a:r>
+              <a:rPr lang="pt-BR" altLang="en-US" sz="1200">
+                <a:sym typeface="+mn-ea"/>
+              </a:rPr>
+              <a:t>4 - Barra de ferramentas de objetos; </a:t>
+            </a:r>
+            <a:endParaRPr lang="pt-BR" altLang="en-US" sz="1200"/>
+          </a:p>
+          <a:p>
+            <a:pPr marL="0" indent="0" algn="just">
+              <a:buFont typeface="Arial" panose="020B0604020202020204" pitchFamily="34" charset="0"/>
+              <a:buNone/>
+            </a:pPr>
+            <a:r>
+              <a:rPr lang="pt-BR" altLang="en-US" sz="1200">
+                <a:sym typeface="+mn-ea"/>
+              </a:rPr>
+              <a:t>5 - Utilize as guias de páginas do relatório para navegar entre as páginas;</a:t>
+            </a:r>
+            <a:endParaRPr lang="pt-BR" altLang="en-US" sz="1200"/>
+          </a:p>
+          <a:p>
+            <a:pPr marL="0" indent="0" algn="just">
+              <a:buFont typeface="Arial" panose="020B0604020202020204" pitchFamily="34" charset="0"/>
+              <a:buNone/>
+            </a:pPr>
+            <a:r>
+              <a:rPr lang="pt-BR" altLang="en-US" sz="1200">
+                <a:sym typeface="+mn-ea"/>
+              </a:rPr>
+              <a:t>6 - No painel "Árvore do Relatório", gerencie a estrutura do relatório;</a:t>
+            </a:r>
+            <a:endParaRPr lang="pt-BR" altLang="en-US" sz="1200"/>
+          </a:p>
+          <a:p>
+            <a:pPr marL="0" indent="0" algn="just">
+              <a:buFont typeface="Arial" panose="020B0604020202020204" pitchFamily="34" charset="0"/>
+              <a:buNone/>
+            </a:pPr>
+            <a:r>
+              <a:rPr lang="pt-BR" altLang="en-US" sz="1200">
+                <a:sym typeface="+mn-ea"/>
+              </a:rPr>
+              <a:t>7 - Faça ajustes nos objetos através do painel "Inspetor de Objetos";</a:t>
+            </a:r>
+            <a:endParaRPr lang="pt-BR" altLang="en-US" sz="1200"/>
+          </a:p>
+          <a:p>
+            <a:pPr marL="0" indent="0" algn="just">
+              <a:buFont typeface="Arial" panose="020B0604020202020204" pitchFamily="34" charset="0"/>
+              <a:buNone/>
+            </a:pPr>
+            <a:r>
+              <a:rPr lang="pt-BR" altLang="en-US" sz="1200">
+                <a:sym typeface="+mn-ea"/>
+              </a:rPr>
+              <a:t>8 - “Árvore de dados”;</a:t>
+            </a:r>
+            <a:endParaRPr lang="pt-BR" altLang="en-US" sz="1200"/>
+          </a:p>
+          <a:p>
+            <a:pPr marL="0" indent="0" algn="just">
+              <a:buFont typeface="Arial" panose="020B0604020202020204" pitchFamily="34" charset="0"/>
+              <a:buNone/>
+            </a:pPr>
+            <a:r>
+              <a:rPr lang="pt-BR" altLang="en-US" sz="1200">
+                <a:sym typeface="+mn-ea"/>
+              </a:rPr>
+              <a:t>9 - Posicione réguas na página do relatório para ajudar no alinhamento de objetos;</a:t>
+            </a:r>
+            <a:endParaRPr lang="pt-BR" altLang="en-US" sz="1200"/>
+          </a:p>
+          <a:p>
+            <a:pPr marL="0" indent="0" algn="just">
+              <a:buFont typeface="Arial" panose="020B0604020202020204" pitchFamily="34" charset="0"/>
+              <a:buNone/>
+            </a:pPr>
+            <a:r>
+              <a:rPr lang="pt-BR" altLang="en-US" sz="1200">
+                <a:sym typeface="+mn-ea"/>
+              </a:rPr>
+              <a:t>10 - Barra de status.</a:t>
+            </a:r>
+            <a:endParaRPr lang="pt-BR" altLang="en-US" sz="1200"/>
+          </a:p>
+          <a:p>
+            <a:endParaRPr lang="pt-BR" altLang="en-US" sz="1200"/>
+          </a:p>
+        </p:txBody>
+      </p:sp>
     </p:spTree>
   </p:cSld>
   <p:clrMapOvr>
@@ -10752,311 +8287,6 @@
 </file>
 
 <file path=ppt/slides/slide5.xml><?xml version="1.0" encoding="utf-8"?>
-<p:sld xmlns:a="http://schemas.openxmlformats.org/drawingml/2006/main" xmlns:r="http://schemas.openxmlformats.org/officeDocument/2006/relationships" xmlns:p="http://schemas.openxmlformats.org/presentationml/2006/main">
-  <p:cSld>
-    <p:spTree>
-      <p:nvGrpSpPr>
-        <p:cNvPr id="1" name=""/>
-        <p:cNvGrpSpPr/>
-        <p:nvPr/>
-      </p:nvGrpSpPr>
-      <p:grpSpPr/>
-      <p:sp>
-        <p:nvSpPr>
-          <p:cNvPr id="2" name="Título 1"/>
-          <p:cNvSpPr>
-            <a:spLocks noGrp="1"/>
-          </p:cNvSpPr>
-          <p:nvPr>
-            <p:ph type="title"/>
-          </p:nvPr>
-        </p:nvSpPr>
-        <p:spPr/>
-        <p:txBody>
-          <a:bodyPr/>
-          <a:p>
-            <a:r>
-              <a:rPr lang="pt-BR" sz="2400" b="1" i="0" strike="noStrike">
-                <a:solidFill>
-                  <a:srgbClr val="00315D"/>
-                </a:solidFill>
-                <a:latin typeface="Arial" panose="020B0604020202020204"/>
-                <a:ea typeface="Arial" panose="020B0604020202020204"/>
-                <a:sym typeface="+mn-ea"/>
-              </a:rPr>
-              <a:t>Interface do designer</a:t>
-            </a:r>
-            <a:endParaRPr lang="pt-BR" altLang="en-US" sz="2400" b="1" i="0" strike="noStrike">
-              <a:solidFill>
-                <a:srgbClr val="00315D"/>
-              </a:solidFill>
-              <a:latin typeface="Arial" panose="020B0604020202020204"/>
-              <a:ea typeface="Arial" panose="020B0604020202020204"/>
-              <a:sym typeface="+mn-ea"/>
-            </a:endParaRPr>
-          </a:p>
-        </p:txBody>
-      </p:sp>
-      <p:sp>
-        <p:nvSpPr>
-          <p:cNvPr id="3" name="Espaço Reservado para Conteúdo 2"/>
-          <p:cNvSpPr>
-            <a:spLocks noGrp="1"/>
-          </p:cNvSpPr>
-          <p:nvPr>
-            <p:ph/>
-          </p:nvPr>
-        </p:nvSpPr>
-        <p:spPr/>
-        <p:txBody>
-          <a:bodyPr/>
-          <a:p>
-            <a:pPr marL="285750" indent="-285750" algn="just">
-              <a:buFont typeface="Arial" panose="020B0604020202020204" pitchFamily="34" charset="0"/>
-              <a:buChar char="•"/>
-            </a:pPr>
-            <a:r>
-              <a:rPr lang="pt-BR" altLang="en-US"/>
-              <a:t>Legenda dos recursos do designer de relatórios:</a:t>
-            </a:r>
-            <a:endParaRPr lang="pt-BR" altLang="en-US"/>
-          </a:p>
-          <a:p>
-            <a:pPr marL="285750" indent="-285750" algn="just">
-              <a:buFont typeface="Arial" panose="020B0604020202020204" pitchFamily="34" charset="0"/>
-              <a:buChar char="•"/>
-            </a:pPr>
-            <a:endParaRPr lang="pt-BR" altLang="en-US"/>
-          </a:p>
-          <a:p>
-            <a:pPr marL="0" indent="0" algn="just">
-              <a:buFont typeface="Arial" panose="020B0604020202020204" pitchFamily="34" charset="0"/>
-              <a:buNone/>
-            </a:pPr>
-            <a:r>
-              <a:rPr lang="pt-BR" altLang="en-US"/>
-              <a:t>1 - Área de trabalho para criar o design do relatório, seria a folha em que o relatório está sendo feito (a folha padrão é a A4).</a:t>
-            </a:r>
-            <a:endParaRPr lang="pt-BR" altLang="en-US"/>
-          </a:p>
-          <a:p>
-            <a:pPr marL="0" indent="0" algn="just">
-              <a:buFont typeface="Arial" panose="020B0604020202020204" pitchFamily="34" charset="0"/>
-              <a:buNone/>
-            </a:pPr>
-            <a:r>
-              <a:rPr lang="pt-BR" altLang="en-US"/>
-              <a:t>2 - Barra do menu.</a:t>
-            </a:r>
-            <a:endParaRPr lang="pt-BR" altLang="en-US"/>
-          </a:p>
-          <a:p>
-            <a:pPr marL="0" indent="0" algn="just">
-              <a:buFont typeface="Arial" panose="020B0604020202020204" pitchFamily="34" charset="0"/>
-              <a:buNone/>
-            </a:pPr>
-            <a:r>
-              <a:rPr lang="pt-BR" altLang="en-US"/>
-              <a:t>3 - Barra de ferramentas. Essas ferramentas são bem semelhantes com as que tem no Word. </a:t>
-            </a:r>
-            <a:endParaRPr lang="pt-BR" altLang="en-US"/>
-          </a:p>
-          <a:p>
-            <a:pPr marL="0" indent="0" algn="just">
-              <a:buFont typeface="Arial" panose="020B0604020202020204" pitchFamily="34" charset="0"/>
-              <a:buNone/>
-            </a:pPr>
-            <a:r>
-              <a:rPr lang="pt-BR" altLang="en-US"/>
-              <a:t>4 - Barra de ferramentas de objetos. Enquanto que a barra anterior está mais relacionado com edição de textos e alinhamento a número 4 tem a ver com a inserção dos campos para dentro da área de trabalho, é nesses campos que os textos e variáveis vão ficar. É nessa barra também que temos acesso às formas geométricas e as bandas que iram compor o relatório.</a:t>
-            </a:r>
-            <a:endParaRPr lang="pt-BR" altLang="en-US"/>
-          </a:p>
-          <a:p>
-            <a:pPr marL="0" indent="0" algn="just">
-              <a:buFont typeface="Arial" panose="020B0604020202020204" pitchFamily="34" charset="0"/>
-              <a:buNone/>
-            </a:pPr>
-            <a:endParaRPr lang="pt-BR" altLang="en-US"/>
-          </a:p>
-        </p:txBody>
-      </p:sp>
-      <p:sp>
-        <p:nvSpPr>
-          <p:cNvPr id="112" name="Google Shape;97;p17"/>
-          <p:cNvSpPr/>
-          <p:nvPr/>
-        </p:nvSpPr>
-        <p:spPr>
-          <a:xfrm flipH="1">
-            <a:off x="-720" y="4570920"/>
-            <a:ext cx="9143640" cy="572400"/>
-          </a:xfrm>
-          <a:prstGeom prst="rtTriangle">
-            <a:avLst/>
-          </a:prstGeom>
-          <a:gradFill rotWithShape="0">
-            <a:gsLst>
-              <a:gs pos="0">
-                <a:srgbClr val="DFE9FB"/>
-              </a:gs>
-              <a:gs pos="100000">
-                <a:srgbClr val="6E9BE7"/>
-              </a:gs>
-            </a:gsLst>
-            <a:lin ang="5394000"/>
-          </a:gradFill>
-          <a:ln w="0">
-            <a:noFill/>
-          </a:ln>
-        </p:spPr>
-        <p:style>
-          <a:lnRef idx="0">
-            <a:srgbClr val="FFFFFF"/>
-          </a:lnRef>
-          <a:fillRef idx="0">
-            <a:srgbClr val="FFFFFF"/>
-          </a:fillRef>
-          <a:effectRef idx="0">
-            <a:srgbClr val="FFFFFF"/>
-          </a:effectRef>
-          <a:fontRef idx="minor"/>
-        </p:style>
-        <p:txBody>
-          <a:bodyPr tIns="91440" bIns="91440" anchor="ctr">
-            <a:noAutofit/>
-          </a:bodyPr>
-          <a:p>
-            <a:pPr>
-              <a:lnSpc>
-                <a:spcPct val="100000"/>
-              </a:lnSpc>
-              <a:tabLst>
-                <a:tab pos="0" algn="l"/>
-              </a:tabLst>
-            </a:pPr>
-            <a:endParaRPr lang="pt-BR" sz="1400" b="0" strike="noStrike" spc="-1">
-              <a:solidFill>
-                <a:srgbClr val="000000"/>
-              </a:solidFill>
-              <a:latin typeface="Arial" panose="020B0604020202020204"/>
-              <a:ea typeface="Arial" panose="020B0604020202020204"/>
-            </a:endParaRPr>
-          </a:p>
-        </p:txBody>
-      </p:sp>
-      <p:sp>
-        <p:nvSpPr>
-          <p:cNvPr id="113" name="Google Shape;98;p17"/>
-          <p:cNvSpPr/>
-          <p:nvPr/>
-        </p:nvSpPr>
-        <p:spPr>
-          <a:xfrm>
-            <a:off x="0" y="4570920"/>
-            <a:ext cx="9143640" cy="572400"/>
-          </a:xfrm>
-          <a:prstGeom prst="rtTriangle">
-            <a:avLst/>
-          </a:prstGeom>
-          <a:gradFill rotWithShape="0">
-            <a:gsLst>
-              <a:gs pos="0">
-                <a:srgbClr val="00315D"/>
-              </a:gs>
-              <a:gs pos="100000">
-                <a:srgbClr val="1155CC"/>
-              </a:gs>
-            </a:gsLst>
-            <a:lin ang="2700000"/>
-          </a:gradFill>
-          <a:ln w="0">
-            <a:noFill/>
-          </a:ln>
-        </p:spPr>
-        <p:style>
-          <a:lnRef idx="0">
-            <a:srgbClr val="FFFFFF"/>
-          </a:lnRef>
-          <a:fillRef idx="0">
-            <a:srgbClr val="FFFFFF"/>
-          </a:fillRef>
-          <a:effectRef idx="0">
-            <a:srgbClr val="FFFFFF"/>
-          </a:effectRef>
-          <a:fontRef idx="minor"/>
-        </p:style>
-        <p:txBody>
-          <a:bodyPr tIns="91440" bIns="91440" anchor="ctr">
-            <a:noAutofit/>
-          </a:bodyPr>
-          <a:p>
-            <a:pPr>
-              <a:lnSpc>
-                <a:spcPct val="100000"/>
-              </a:lnSpc>
-              <a:tabLst>
-                <a:tab pos="0" algn="l"/>
-              </a:tabLst>
-            </a:pPr>
-            <a:endParaRPr lang="pt-BR" sz="1400" b="0" strike="noStrike" spc="-1">
-              <a:solidFill>
-                <a:srgbClr val="000000"/>
-              </a:solidFill>
-              <a:latin typeface="Arial" panose="020B0604020202020204"/>
-              <a:ea typeface="Arial" panose="020B0604020202020204"/>
-            </a:endParaRPr>
-          </a:p>
-        </p:txBody>
-      </p:sp>
-      <p:pic>
-        <p:nvPicPr>
-          <p:cNvPr id="114" name="Google Shape;99;p17"/>
-          <p:cNvPicPr/>
-          <p:nvPr/>
-        </p:nvPicPr>
-        <p:blipFill>
-          <a:blip r:embed="rId1"/>
-          <a:stretch>
-            <a:fillRect/>
-          </a:stretch>
-        </p:blipFill>
-        <p:spPr>
-          <a:xfrm>
-            <a:off x="117000" y="4700520"/>
-            <a:ext cx="1223280" cy="466920"/>
-          </a:xfrm>
-          <a:prstGeom prst="rect">
-            <a:avLst/>
-          </a:prstGeom>
-          <a:ln w="0">
-            <a:noFill/>
-          </a:ln>
-          <a:effectLst>
-            <a:outerShdw blurRad="57240" dist="19080" dir="5400000" algn="bl" rotWithShape="0">
-              <a:srgbClr val="000000">
-                <a:alpha val="50000"/>
-              </a:srgbClr>
-            </a:outerShdw>
-          </a:effectLst>
-        </p:spPr>
-      </p:pic>
-    </p:spTree>
-  </p:cSld>
-  <p:clrMapOvr>
-    <a:masterClrMapping/>
-  </p:clrMapOvr>
-  <p:timing>
-    <p:tnLst>
-      <p:par>
-        <p:cTn id="1" dur="indefinite" restart="never" nodeType="tmRoot"/>
-      </p:par>
-    </p:tnLst>
-  </p:timing>
-</p:sld>
-</file>
-
-<file path=ppt/slides/slide6.xml><?xml version="1.0" encoding="utf-8"?>
 <p:sld xmlns:a="http://schemas.openxmlformats.org/drawingml/2006/main" xmlns:r="http://schemas.openxmlformats.org/officeDocument/2006/relationships" xmlns:p="http://schemas.openxmlformats.org/presentationml/2006/main">
   <p:cSld>
     <p:spTree>
@@ -11349,7 +8579,7 @@
 </p:sld>
 </file>
 
-<file path=ppt/slides/slide7.xml><?xml version="1.0" encoding="utf-8"?>
+<file path=ppt/slides/slide6.xml><?xml version="1.0" encoding="utf-8"?>
 <p:sld xmlns:a="http://schemas.openxmlformats.org/drawingml/2006/main" xmlns:r="http://schemas.openxmlformats.org/officeDocument/2006/relationships" xmlns:p="http://schemas.openxmlformats.org/presentationml/2006/main">
   <p:cSld>
     <p:spTree>
@@ -11740,7 +8970,7 @@
 </p:sld>
 </file>
 
-<file path=ppt/slides/slide8.xml><?xml version="1.0" encoding="utf-8"?>
+<file path=ppt/slides/slide7.xml><?xml version="1.0" encoding="utf-8"?>
 <p:sld xmlns:a="http://schemas.openxmlformats.org/drawingml/2006/main" xmlns:r="http://schemas.openxmlformats.org/officeDocument/2006/relationships" xmlns:p="http://schemas.openxmlformats.org/presentationml/2006/main">
   <p:cSld>
     <p:spTree>
@@ -12045,7 +9275,7 @@
 </p:sld>
 </file>
 
-<file path=ppt/slides/slide9.xml><?xml version="1.0" encoding="utf-8"?>
+<file path=ppt/slides/slide8.xml><?xml version="1.0" encoding="utf-8"?>
 <p:sld xmlns:a="http://schemas.openxmlformats.org/drawingml/2006/main" xmlns:r="http://schemas.openxmlformats.org/officeDocument/2006/relationships" xmlns:p="http://schemas.openxmlformats.org/presentationml/2006/main">
   <p:cSld>
     <p:spTree>
@@ -12483,6 +9713,299 @@
           <a:prstGeom prst="rect">
             <a:avLst/>
           </a:prstGeom>
+        </p:spPr>
+      </p:pic>
+    </p:spTree>
+  </p:cSld>
+  <p:clrMapOvr>
+    <a:masterClrMapping/>
+  </p:clrMapOvr>
+  <mc:AlternateContent xmlns:mc="http://schemas.openxmlformats.org/markup-compatibility/2006">
+    <mc:Choice xmlns:p14="http://schemas.microsoft.com/office/powerpoint/2010/main" Requires="p14">
+      <p:transition spd="slow" p14:dur="1000">
+        <p:wipe/>
+      </p:transition>
+    </mc:Choice>
+    <mc:Fallback>
+      <p:transition spd="slow">
+        <p:wipe/>
+      </p:transition>
+    </mc:Fallback>
+  </mc:AlternateContent>
+  <p:timing>
+    <p:tnLst>
+      <p:par>
+        <p:cTn id="1" dur="indefinite" restart="never" nodeType="tmRoot"/>
+      </p:par>
+    </p:tnLst>
+  </p:timing>
+</p:sld>
+</file>
+
+<file path=ppt/slides/slide9.xml><?xml version="1.0" encoding="utf-8"?>
+<p:sld xmlns:a="http://schemas.openxmlformats.org/drawingml/2006/main" xmlns:r="http://schemas.openxmlformats.org/officeDocument/2006/relationships" xmlns:p="http://schemas.openxmlformats.org/presentationml/2006/main">
+  <p:cSld>
+    <p:spTree>
+      <p:nvGrpSpPr>
+        <p:cNvPr id="1" name=""/>
+        <p:cNvGrpSpPr/>
+        <p:nvPr/>
+      </p:nvGrpSpPr>
+      <p:grpSpPr/>
+      <p:sp>
+        <p:nvSpPr>
+          <p:cNvPr id="2" name="Título 1"/>
+          <p:cNvSpPr>
+            <a:spLocks noGrp="1"/>
+          </p:cNvSpPr>
+          <p:nvPr>
+            <p:ph type="title"/>
+          </p:nvPr>
+        </p:nvSpPr>
+        <p:spPr/>
+        <p:txBody>
+          <a:bodyPr/>
+          <a:p>
+            <a:r>
+              <a:rPr lang="pt-BR" sz="2400" b="1" strike="noStrike">
+                <a:solidFill>
+                  <a:srgbClr val="00315D"/>
+                </a:solidFill>
+                <a:latin typeface="Arial" panose="020B0604020202020204"/>
+                <a:ea typeface="Arial" panose="020B0604020202020204"/>
+                <a:sym typeface="+mn-ea"/>
+              </a:rPr>
+              <a:t>Parâmetros</a:t>
+            </a:r>
+            <a:r>
+              <a:rPr lang="pt-BR" sz="2400" b="1" i="1" strike="noStrike">
+                <a:solidFill>
+                  <a:srgbClr val="00315D"/>
+                </a:solidFill>
+                <a:latin typeface="Arial" panose="020B0604020202020204"/>
+                <a:ea typeface="Arial" panose="020B0604020202020204"/>
+                <a:sym typeface="+mn-ea"/>
+              </a:rPr>
+              <a:t> - </a:t>
+            </a:r>
+            <a:r>
+              <a:rPr lang="pt-BR" sz="2400" b="1" i="0" strike="noStrike">
+                <a:solidFill>
+                  <a:srgbClr val="00315D"/>
+                </a:solidFill>
+                <a:latin typeface="Arial" panose="020B0604020202020204"/>
+                <a:ea typeface="Arial" panose="020B0604020202020204"/>
+                <a:sym typeface="+mn-ea"/>
+              </a:rPr>
+              <a:t>Como criar</a:t>
+            </a:r>
+            <a:endParaRPr lang="pt-BR" altLang="en-US" sz="2400" b="1" i="1" strike="noStrike">
+              <a:solidFill>
+                <a:srgbClr val="00315D"/>
+              </a:solidFill>
+              <a:latin typeface="Arial" panose="020B0604020202020204"/>
+              <a:ea typeface="Arial" panose="020B0604020202020204"/>
+              <a:sym typeface="+mn-ea"/>
+            </a:endParaRPr>
+          </a:p>
+        </p:txBody>
+      </p:sp>
+      <p:sp>
+        <p:nvSpPr>
+          <p:cNvPr id="3" name="Espaço Reservado para Conteúdo 2"/>
+          <p:cNvSpPr>
+            <a:spLocks noGrp="1"/>
+          </p:cNvSpPr>
+          <p:nvPr>
+            <p:ph/>
+          </p:nvPr>
+        </p:nvSpPr>
+        <p:spPr>
+          <a:xfrm>
+            <a:off x="311785" y="1152525"/>
+            <a:ext cx="8667750" cy="3416300"/>
+          </a:xfrm>
+        </p:spPr>
+        <p:txBody>
+          <a:bodyPr/>
+          <a:p>
+            <a:pPr marL="285750" indent="-285750">
+              <a:buFont typeface="Arial" panose="020B0604020202020204" pitchFamily="34" charset="0"/>
+              <a:buChar char="•"/>
+            </a:pPr>
+            <a:r>
+              <a:rPr lang="pt-BR" altLang="en-US" sz="1600"/>
+              <a:t>Caso sua consulta tenha paramêtros, será preciso criar uma variavel para receber o valor. Segue o vídeo abaixo demonstrando:</a:t>
+            </a:r>
+            <a:endParaRPr lang="pt-BR" altLang="en-US" sz="1600" b="0"/>
+          </a:p>
+          <a:p>
+            <a:pPr marL="285750" indent="-285750">
+              <a:buFont typeface="Arial" panose="020B0604020202020204" pitchFamily="34" charset="0"/>
+              <a:buChar char="•"/>
+            </a:pPr>
+            <a:endParaRPr lang="pt-BR" altLang="en-US" sz="1600" b="0"/>
+          </a:p>
+        </p:txBody>
+      </p:sp>
+      <p:sp>
+        <p:nvSpPr>
+          <p:cNvPr id="112" name="Google Shape;97;p17"/>
+          <p:cNvSpPr/>
+          <p:nvPr/>
+        </p:nvSpPr>
+        <p:spPr>
+          <a:xfrm flipH="1">
+            <a:off x="-720" y="4570920"/>
+            <a:ext cx="9143640" cy="572400"/>
+          </a:xfrm>
+          <a:prstGeom prst="rtTriangle">
+            <a:avLst/>
+          </a:prstGeom>
+          <a:gradFill rotWithShape="0">
+            <a:gsLst>
+              <a:gs pos="0">
+                <a:srgbClr val="DFE9FB"/>
+              </a:gs>
+              <a:gs pos="100000">
+                <a:srgbClr val="6E9BE7"/>
+              </a:gs>
+            </a:gsLst>
+            <a:lin ang="5394000"/>
+          </a:gradFill>
+          <a:ln w="0">
+            <a:noFill/>
+          </a:ln>
+        </p:spPr>
+        <p:style>
+          <a:lnRef idx="0">
+            <a:srgbClr val="FFFFFF"/>
+          </a:lnRef>
+          <a:fillRef idx="0">
+            <a:srgbClr val="FFFFFF"/>
+          </a:fillRef>
+          <a:effectRef idx="0">
+            <a:srgbClr val="FFFFFF"/>
+          </a:effectRef>
+          <a:fontRef idx="minor"/>
+        </p:style>
+        <p:txBody>
+          <a:bodyPr tIns="91440" bIns="91440" anchor="ctr">
+            <a:noAutofit/>
+          </a:bodyPr>
+          <a:p>
+            <a:pPr>
+              <a:lnSpc>
+                <a:spcPct val="100000"/>
+              </a:lnSpc>
+              <a:tabLst>
+                <a:tab pos="0" algn="l"/>
+              </a:tabLst>
+            </a:pPr>
+            <a:endParaRPr lang="pt-BR" sz="1400" b="0" strike="noStrike" spc="-1">
+              <a:solidFill>
+                <a:srgbClr val="000000"/>
+              </a:solidFill>
+              <a:latin typeface="Arial" panose="020B0604020202020204"/>
+              <a:ea typeface="Arial" panose="020B0604020202020204"/>
+            </a:endParaRPr>
+          </a:p>
+        </p:txBody>
+      </p:sp>
+      <p:sp>
+        <p:nvSpPr>
+          <p:cNvPr id="113" name="Google Shape;98;p17"/>
+          <p:cNvSpPr/>
+          <p:nvPr/>
+        </p:nvSpPr>
+        <p:spPr>
+          <a:xfrm>
+            <a:off x="0" y="4570920"/>
+            <a:ext cx="9143640" cy="572400"/>
+          </a:xfrm>
+          <a:prstGeom prst="rtTriangle">
+            <a:avLst/>
+          </a:prstGeom>
+          <a:gradFill rotWithShape="0">
+            <a:gsLst>
+              <a:gs pos="0">
+                <a:srgbClr val="00315D"/>
+              </a:gs>
+              <a:gs pos="100000">
+                <a:srgbClr val="1155CC"/>
+              </a:gs>
+            </a:gsLst>
+            <a:lin ang="2700000"/>
+          </a:gradFill>
+          <a:ln w="0">
+            <a:noFill/>
+          </a:ln>
+        </p:spPr>
+        <p:style>
+          <a:lnRef idx="0">
+            <a:srgbClr val="FFFFFF"/>
+          </a:lnRef>
+          <a:fillRef idx="0">
+            <a:srgbClr val="FFFFFF"/>
+          </a:fillRef>
+          <a:effectRef idx="0">
+            <a:srgbClr val="FFFFFF"/>
+          </a:effectRef>
+          <a:fontRef idx="minor"/>
+        </p:style>
+        <p:txBody>
+          <a:bodyPr tIns="91440" bIns="91440" anchor="ctr">
+            <a:noAutofit/>
+          </a:bodyPr>
+          <a:p>
+            <a:pPr>
+              <a:lnSpc>
+                <a:spcPct val="100000"/>
+              </a:lnSpc>
+              <a:tabLst>
+                <a:tab pos="0" algn="l"/>
+              </a:tabLst>
+            </a:pPr>
+            <a:endParaRPr lang="pt-BR" sz="1400" b="0" strike="noStrike" spc="-1">
+              <a:solidFill>
+                <a:srgbClr val="000000"/>
+              </a:solidFill>
+              <a:latin typeface="Arial" panose="020B0604020202020204"/>
+              <a:ea typeface="Arial" panose="020B0604020202020204"/>
+            </a:endParaRPr>
+          </a:p>
+        </p:txBody>
+      </p:sp>
+      <p:pic>
+        <p:nvPicPr>
+          <p:cNvPr id="114" name="Google Shape;99;p17"/>
+          <p:cNvPicPr/>
+          <p:nvPr/>
+        </p:nvPicPr>
+        <p:blipFill>
+          <a:blip r:embed="rId1"/>
+          <a:stretch>
+            <a:fillRect/>
+          </a:stretch>
+        </p:blipFill>
+        <p:spPr>
+          <a:xfrm>
+            <a:off x="117000" y="4700520"/>
+            <a:ext cx="1223280" cy="466920"/>
+          </a:xfrm>
+          <a:prstGeom prst="rect">
+            <a:avLst/>
+          </a:prstGeom>
+          <a:ln w="0">
+            <a:noFill/>
+          </a:ln>
+          <a:effectLst>
+            <a:outerShdw blurRad="57240" dist="19080" dir="5400000" algn="bl" rotWithShape="0">
+              <a:srgbClr val="000000">
+                <a:alpha val="50000"/>
+              </a:srgbClr>
+            </a:outerShdw>
+          </a:effectLst>
         </p:spPr>
       </p:pic>
     </p:spTree>

</xml_diff>